<commit_message>
more progress on presentation
</commit_message>
<xml_diff>
--- a/Thesis/Thesis Presentation.pptx
+++ b/Thesis/Thesis Presentation.pptx
@@ -2,18 +2,18 @@
 <file path=ppt/presentation.xml><?xml version="1.0" encoding="utf-8"?>
 <p:presentation xmlns:a="http://schemas.openxmlformats.org/drawingml/2006/main" xmlns:r="http://schemas.openxmlformats.org/officeDocument/2006/relationships" xmlns:p="http://schemas.openxmlformats.org/presentationml/2006/main" saveSubsetFonts="1">
   <p:sldMasterIdLst>
-    <p:sldMasterId id="2147483816" r:id="rId1"/>
+    <p:sldMasterId id="2147483855" r:id="rId1"/>
   </p:sldMasterIdLst>
   <p:sldIdLst>
     <p:sldId id="256" r:id="rId2"/>
-    <p:sldId id="257" r:id="rId3"/>
-    <p:sldId id="259" r:id="rId4"/>
-    <p:sldId id="258" r:id="rId5"/>
+    <p:sldId id="276" r:id="rId3"/>
+    <p:sldId id="257" r:id="rId4"/>
+    <p:sldId id="260" r:id="rId5"/>
     <p:sldId id="266" r:id="rId6"/>
-    <p:sldId id="260" r:id="rId7"/>
-    <p:sldId id="261" r:id="rId8"/>
-    <p:sldId id="262" r:id="rId9"/>
-    <p:sldId id="263" r:id="rId10"/>
+    <p:sldId id="261" r:id="rId7"/>
+    <p:sldId id="259" r:id="rId8"/>
+    <p:sldId id="263" r:id="rId9"/>
+    <p:sldId id="258" r:id="rId10"/>
     <p:sldId id="264" r:id="rId11"/>
     <p:sldId id="274" r:id="rId12"/>
     <p:sldId id="267" r:id="rId13"/>
@@ -123,12 +123,17 @@
       </a:defRPr>
     </a:lvl9pPr>
   </p:defaultTextStyle>
+  <p:extLst>
+    <p:ext uri="{EFAFB233-063F-42B5-8137-9DF3F51BA10A}">
+      <p15:sldGuideLst xmlns:p15="http://schemas.microsoft.com/office/powerpoint/2012/main"/>
+    </p:ext>
+  </p:extLst>
 </p:presentation>
 </file>
 
 <file path=ppt/slideLayouts/slideLayout1.xml><?xml version="1.0" encoding="utf-8"?>
 <p:sldLayout xmlns:a="http://schemas.openxmlformats.org/drawingml/2006/main" xmlns:r="http://schemas.openxmlformats.org/officeDocument/2006/relationships" xmlns:p="http://schemas.openxmlformats.org/presentationml/2006/main" showMasterSp="0" type="title" preserve="1">
-  <p:cSld name="Title Slide">
+  <p:cSld name="Tittellysbilde">
     <p:bg>
       <p:bgPr>
         <a:solidFill>
@@ -187,8 +192,8 @@
           </a:lstStyle>
           <a:p>
             <a:r>
-              <a:rPr lang="en-US"/>
-              <a:t>Click to edit Master title style</a:t>
+              <a:rPr lang="nb-NO"/>
+              <a:t>Klikk for å redigere tittelstil</a:t>
             </a:r>
             <a:endParaRPr lang="en-US" dirty="0"/>
           </a:p>
@@ -260,8 +265,8 @@
           </a:lstStyle>
           <a:p>
             <a:r>
-              <a:rPr lang="en-US"/>
-              <a:t>Click to edit Master subtitle style</a:t>
+              <a:rPr lang="nb-NO"/>
+              <a:t>Klikk for å redigere undertittelstil i malen</a:t>
             </a:r>
             <a:endParaRPr lang="en-US" dirty="0"/>
           </a:p>
@@ -294,7 +299,7 @@
           <a:p>
             <a:fld id="{2B324E1D-5BFC-4A26-948C-815C71133AD7}" type="datetimeFigureOut">
               <a:rPr lang="en-US" smtClean="0"/>
-              <a:t>10/25/2022</a:t>
+              <a:t>10/31/2022</a:t>
             </a:fld>
             <a:endParaRPr lang="en-US"/>
           </a:p>
@@ -403,7 +408,7 @@
     </p:spTree>
     <p:extLst>
       <p:ext uri="{BB962C8B-B14F-4D97-AF65-F5344CB8AC3E}">
-        <p14:creationId xmlns:p14="http://schemas.microsoft.com/office/powerpoint/2010/main" val="97511027"/>
+        <p14:creationId xmlns:p14="http://schemas.microsoft.com/office/powerpoint/2010/main" val="3546672756"/>
       </p:ext>
     </p:extLst>
   </p:cSld>
@@ -415,7 +420,7 @@
 
 <file path=ppt/slideLayouts/slideLayout10.xml><?xml version="1.0" encoding="utf-8"?>
 <p:sldLayout xmlns:a="http://schemas.openxmlformats.org/drawingml/2006/main" xmlns:r="http://schemas.openxmlformats.org/officeDocument/2006/relationships" xmlns:p="http://schemas.openxmlformats.org/presentationml/2006/main" type="vertTx" preserve="1">
-  <p:cSld name="Title and Vertical Text">
+  <p:cSld name="Loddrett tekst">
     <p:spTree>
       <p:nvGrpSpPr>
         <p:cNvPr id="1" name=""/>
@@ -446,8 +451,8 @@
           <a:lstStyle/>
           <a:p>
             <a:r>
-              <a:rPr lang="en-US"/>
-              <a:t>Click to edit Master title style</a:t>
+              <a:rPr lang="nb-NO"/>
+              <a:t>Klikk for å redigere tittelstil</a:t>
             </a:r>
             <a:endParaRPr lang="en-US" dirty="0"/>
           </a:p>
@@ -470,36 +475,36 @@
           <a:p>
             <a:pPr lvl="0"/>
             <a:r>
-              <a:rPr lang="en-US"/>
-              <a:t>Click to edit Master text styles</a:t>
+              <a:rPr lang="nb-NO"/>
+              <a:t>Klikk for å redigere tekststiler i malen</a:t>
             </a:r>
           </a:p>
           <a:p>
             <a:pPr lvl="1"/>
             <a:r>
-              <a:rPr lang="en-US"/>
-              <a:t>Second level</a:t>
+              <a:rPr lang="nb-NO"/>
+              <a:t>Andre nivå</a:t>
             </a:r>
           </a:p>
           <a:p>
             <a:pPr lvl="2"/>
             <a:r>
-              <a:rPr lang="en-US"/>
-              <a:t>Third level</a:t>
+              <a:rPr lang="nb-NO"/>
+              <a:t>Tredje nivå</a:t>
             </a:r>
           </a:p>
           <a:p>
             <a:pPr lvl="3"/>
             <a:r>
-              <a:rPr lang="en-US"/>
-              <a:t>Fourth level</a:t>
+              <a:rPr lang="nb-NO"/>
+              <a:t>Fjerde nivå</a:t>
             </a:r>
           </a:p>
           <a:p>
             <a:pPr lvl="4"/>
             <a:r>
-              <a:rPr lang="en-US"/>
-              <a:t>Fifth level</a:t>
+              <a:rPr lang="nb-NO"/>
+              <a:t>Femte nivå</a:t>
             </a:r>
             <a:endParaRPr lang="en-US" dirty="0"/>
           </a:p>
@@ -522,7 +527,7 @@
           <a:p>
             <a:fld id="{2B324E1D-5BFC-4A26-948C-815C71133AD7}" type="datetimeFigureOut">
               <a:rPr lang="en-US" smtClean="0"/>
-              <a:t>10/25/2022</a:t>
+              <a:t>10/31/2022</a:t>
             </a:fld>
             <a:endParaRPr lang="en-US"/>
           </a:p>
@@ -573,7 +578,7 @@
     </p:spTree>
     <p:extLst>
       <p:ext uri="{BB962C8B-B14F-4D97-AF65-F5344CB8AC3E}">
-        <p14:creationId xmlns:p14="http://schemas.microsoft.com/office/powerpoint/2010/main" val="1869537835"/>
+        <p14:creationId xmlns:p14="http://schemas.microsoft.com/office/powerpoint/2010/main" val="3171780141"/>
       </p:ext>
     </p:extLst>
   </p:cSld>
@@ -585,7 +590,7 @@
 
 <file path=ppt/slideLayouts/slideLayout11.xml><?xml version="1.0" encoding="utf-8"?>
 <p:sldLayout xmlns:a="http://schemas.openxmlformats.org/drawingml/2006/main" xmlns:r="http://schemas.openxmlformats.org/officeDocument/2006/relationships" xmlns:p="http://schemas.openxmlformats.org/presentationml/2006/main" type="vertTitleAndTx" preserve="1">
-  <p:cSld name="Vertical Title and Text">
+  <p:cSld name="Loddrett tittel og tekst">
     <p:spTree>
       <p:nvGrpSpPr>
         <p:cNvPr id="1" name=""/>
@@ -621,8 +626,8 @@
           <a:lstStyle/>
           <a:p>
             <a:r>
-              <a:rPr lang="en-US"/>
-              <a:t>Click to edit Master title style</a:t>
+              <a:rPr lang="nb-NO"/>
+              <a:t>Klikk for å redigere tittelstil</a:t>
             </a:r>
             <a:endParaRPr lang="en-US" dirty="0"/>
           </a:p>
@@ -650,36 +655,36 @@
           <a:p>
             <a:pPr lvl="0"/>
             <a:r>
-              <a:rPr lang="en-US"/>
-              <a:t>Click to edit Master text styles</a:t>
+              <a:rPr lang="nb-NO"/>
+              <a:t>Klikk for å redigere tekststiler i malen</a:t>
             </a:r>
           </a:p>
           <a:p>
             <a:pPr lvl="1"/>
             <a:r>
-              <a:rPr lang="en-US"/>
-              <a:t>Second level</a:t>
+              <a:rPr lang="nb-NO"/>
+              <a:t>Andre nivå</a:t>
             </a:r>
           </a:p>
           <a:p>
             <a:pPr lvl="2"/>
             <a:r>
-              <a:rPr lang="en-US"/>
-              <a:t>Third level</a:t>
+              <a:rPr lang="nb-NO"/>
+              <a:t>Tredje nivå</a:t>
             </a:r>
           </a:p>
           <a:p>
             <a:pPr lvl="3"/>
             <a:r>
-              <a:rPr lang="en-US"/>
-              <a:t>Fourth level</a:t>
+              <a:rPr lang="nb-NO"/>
+              <a:t>Fjerde nivå</a:t>
             </a:r>
           </a:p>
           <a:p>
             <a:pPr lvl="4"/>
             <a:r>
-              <a:rPr lang="en-US"/>
-              <a:t>Fifth level</a:t>
+              <a:rPr lang="nb-NO"/>
+              <a:t>Femte nivå</a:t>
             </a:r>
             <a:endParaRPr lang="en-US" dirty="0"/>
           </a:p>
@@ -702,7 +707,7 @@
           <a:p>
             <a:fld id="{2B324E1D-5BFC-4A26-948C-815C71133AD7}" type="datetimeFigureOut">
               <a:rPr lang="en-US" smtClean="0"/>
-              <a:t>10/25/2022</a:t>
+              <a:t>10/31/2022</a:t>
             </a:fld>
             <a:endParaRPr lang="en-US"/>
           </a:p>
@@ -753,7 +758,7 @@
     </p:spTree>
     <p:extLst>
       <p:ext uri="{BB962C8B-B14F-4D97-AF65-F5344CB8AC3E}">
-        <p14:creationId xmlns:p14="http://schemas.microsoft.com/office/powerpoint/2010/main" val="1355200046"/>
+        <p14:creationId xmlns:p14="http://schemas.microsoft.com/office/powerpoint/2010/main" val="4087460011"/>
       </p:ext>
     </p:extLst>
   </p:cSld>
@@ -765,7 +770,7 @@
 
 <file path=ppt/slideLayouts/slideLayout2.xml><?xml version="1.0" encoding="utf-8"?>
 <p:sldLayout xmlns:a="http://schemas.openxmlformats.org/drawingml/2006/main" xmlns:r="http://schemas.openxmlformats.org/officeDocument/2006/relationships" xmlns:p="http://schemas.openxmlformats.org/presentationml/2006/main" type="obj" preserve="1">
-  <p:cSld name="Title and Content">
+  <p:cSld name="Tittel og innhold">
     <p:spTree>
       <p:nvGrpSpPr>
         <p:cNvPr id="1" name=""/>
@@ -796,8 +801,8 @@
           <a:lstStyle/>
           <a:p>
             <a:r>
-              <a:rPr lang="en-US"/>
-              <a:t>Click to edit Master title style</a:t>
+              <a:rPr lang="nb-NO"/>
+              <a:t>Klikk for å redigere tittelstil</a:t>
             </a:r>
             <a:endParaRPr lang="en-US" dirty="0"/>
           </a:p>
@@ -820,36 +825,36 @@
           <a:p>
             <a:pPr lvl="0"/>
             <a:r>
-              <a:rPr lang="en-US"/>
-              <a:t>Click to edit Master text styles</a:t>
+              <a:rPr lang="nb-NO"/>
+              <a:t>Klikk for å redigere tekststiler i malen</a:t>
             </a:r>
           </a:p>
           <a:p>
             <a:pPr lvl="1"/>
             <a:r>
-              <a:rPr lang="en-US"/>
-              <a:t>Second level</a:t>
+              <a:rPr lang="nb-NO"/>
+              <a:t>Andre nivå</a:t>
             </a:r>
           </a:p>
           <a:p>
             <a:pPr lvl="2"/>
             <a:r>
-              <a:rPr lang="en-US"/>
-              <a:t>Third level</a:t>
+              <a:rPr lang="nb-NO"/>
+              <a:t>Tredje nivå</a:t>
             </a:r>
           </a:p>
           <a:p>
             <a:pPr lvl="3"/>
             <a:r>
-              <a:rPr lang="en-US"/>
-              <a:t>Fourth level</a:t>
+              <a:rPr lang="nb-NO"/>
+              <a:t>Fjerde nivå</a:t>
             </a:r>
           </a:p>
           <a:p>
             <a:pPr lvl="4"/>
             <a:r>
-              <a:rPr lang="en-US"/>
-              <a:t>Fifth level</a:t>
+              <a:rPr lang="nb-NO"/>
+              <a:t>Femte nivå</a:t>
             </a:r>
             <a:endParaRPr lang="en-US" dirty="0"/>
           </a:p>
@@ -872,7 +877,7 @@
           <a:p>
             <a:fld id="{2B324E1D-5BFC-4A26-948C-815C71133AD7}" type="datetimeFigureOut">
               <a:rPr lang="en-US" smtClean="0"/>
-              <a:t>10/25/2022</a:t>
+              <a:t>10/31/2022</a:t>
             </a:fld>
             <a:endParaRPr lang="en-US"/>
           </a:p>
@@ -923,7 +928,7 @@
     </p:spTree>
     <p:extLst>
       <p:ext uri="{BB962C8B-B14F-4D97-AF65-F5344CB8AC3E}">
-        <p14:creationId xmlns:p14="http://schemas.microsoft.com/office/powerpoint/2010/main" val="657462524"/>
+        <p14:creationId xmlns:p14="http://schemas.microsoft.com/office/powerpoint/2010/main" val="2337471243"/>
       </p:ext>
     </p:extLst>
   </p:cSld>
@@ -935,7 +940,7 @@
 
 <file path=ppt/slideLayouts/slideLayout3.xml><?xml version="1.0" encoding="utf-8"?>
 <p:sldLayout xmlns:a="http://schemas.openxmlformats.org/drawingml/2006/main" xmlns:r="http://schemas.openxmlformats.org/officeDocument/2006/relationships" xmlns:p="http://schemas.openxmlformats.org/presentationml/2006/main" type="secHead" preserve="1">
-  <p:cSld name="Section Header">
+  <p:cSld name="Deloverskrift">
     <p:spTree>
       <p:nvGrpSpPr>
         <p:cNvPr id="1" name=""/>
@@ -980,8 +985,8 @@
           </a:lstStyle>
           <a:p>
             <a:r>
-              <a:rPr lang="en-US"/>
-              <a:t>Click to edit Master title style</a:t>
+              <a:rPr lang="nb-NO"/>
+              <a:t>Klikk for å redigere tittelstil</a:t>
             </a:r>
             <a:endParaRPr lang="en-US" dirty="0"/>
           </a:p>
@@ -1103,8 +1108,8 @@
           <a:p>
             <a:pPr lvl="0"/>
             <a:r>
-              <a:rPr lang="en-US"/>
-              <a:t>Click to edit Master text styles</a:t>
+              <a:rPr lang="nb-NO"/>
+              <a:t>Klikk for å redigere tekststiler i malen</a:t>
             </a:r>
           </a:p>
         </p:txBody>
@@ -1126,7 +1131,7 @@
           <a:p>
             <a:fld id="{2B324E1D-5BFC-4A26-948C-815C71133AD7}" type="datetimeFigureOut">
               <a:rPr lang="en-US" smtClean="0"/>
-              <a:t>10/25/2022</a:t>
+              <a:t>10/31/2022</a:t>
             </a:fld>
             <a:endParaRPr lang="en-US"/>
           </a:p>
@@ -1215,7 +1220,7 @@
     </p:spTree>
     <p:extLst>
       <p:ext uri="{BB962C8B-B14F-4D97-AF65-F5344CB8AC3E}">
-        <p14:creationId xmlns:p14="http://schemas.microsoft.com/office/powerpoint/2010/main" val="799160117"/>
+        <p14:creationId xmlns:p14="http://schemas.microsoft.com/office/powerpoint/2010/main" val="3059851827"/>
       </p:ext>
     </p:extLst>
   </p:cSld>
@@ -1227,7 +1232,7 @@
 
 <file path=ppt/slideLayouts/slideLayout4.xml><?xml version="1.0" encoding="utf-8"?>
 <p:sldLayout xmlns:a="http://schemas.openxmlformats.org/drawingml/2006/main" xmlns:r="http://schemas.openxmlformats.org/officeDocument/2006/relationships" xmlns:p="http://schemas.openxmlformats.org/presentationml/2006/main" type="twoObj" preserve="1">
-  <p:cSld name="Two Content">
+  <p:cSld name="To innholdsdeler">
     <p:spTree>
       <p:nvGrpSpPr>
         <p:cNvPr id="1" name=""/>
@@ -1258,8 +1263,8 @@
           <a:lstStyle/>
           <a:p>
             <a:r>
-              <a:rPr lang="en-US"/>
-              <a:t>Click to edit Master title style</a:t>
+              <a:rPr lang="nb-NO"/>
+              <a:t>Klikk for å redigere tittelstil</a:t>
             </a:r>
             <a:endParaRPr lang="en-US" dirty="0"/>
           </a:p>
@@ -1315,36 +1320,36 @@
           <a:p>
             <a:pPr lvl="0"/>
             <a:r>
-              <a:rPr lang="en-US"/>
-              <a:t>Click to edit Master text styles</a:t>
+              <a:rPr lang="nb-NO"/>
+              <a:t>Klikk for å redigere tekststiler i malen</a:t>
             </a:r>
           </a:p>
           <a:p>
             <a:pPr lvl="1"/>
             <a:r>
-              <a:rPr lang="en-US"/>
-              <a:t>Second level</a:t>
+              <a:rPr lang="nb-NO"/>
+              <a:t>Andre nivå</a:t>
             </a:r>
           </a:p>
           <a:p>
             <a:pPr lvl="2"/>
             <a:r>
-              <a:rPr lang="en-US"/>
-              <a:t>Third level</a:t>
+              <a:rPr lang="nb-NO"/>
+              <a:t>Tredje nivå</a:t>
             </a:r>
           </a:p>
           <a:p>
             <a:pPr lvl="3"/>
             <a:r>
-              <a:rPr lang="en-US"/>
-              <a:t>Fourth level</a:t>
+              <a:rPr lang="nb-NO"/>
+              <a:t>Fjerde nivå</a:t>
             </a:r>
           </a:p>
           <a:p>
             <a:pPr lvl="4"/>
             <a:r>
-              <a:rPr lang="en-US"/>
-              <a:t>Fifth level</a:t>
+              <a:rPr lang="nb-NO"/>
+              <a:t>Femte nivå</a:t>
             </a:r>
             <a:endParaRPr lang="en-US" dirty="0"/>
           </a:p>
@@ -1400,36 +1405,36 @@
           <a:p>
             <a:pPr lvl="0"/>
             <a:r>
-              <a:rPr lang="en-US"/>
-              <a:t>Click to edit Master text styles</a:t>
+              <a:rPr lang="nb-NO"/>
+              <a:t>Klikk for å redigere tekststiler i malen</a:t>
             </a:r>
           </a:p>
           <a:p>
             <a:pPr lvl="1"/>
             <a:r>
-              <a:rPr lang="en-US"/>
-              <a:t>Second level</a:t>
+              <a:rPr lang="nb-NO"/>
+              <a:t>Andre nivå</a:t>
             </a:r>
           </a:p>
           <a:p>
             <a:pPr lvl="2"/>
             <a:r>
-              <a:rPr lang="en-US"/>
-              <a:t>Third level</a:t>
+              <a:rPr lang="nb-NO"/>
+              <a:t>Tredje nivå</a:t>
             </a:r>
           </a:p>
           <a:p>
             <a:pPr lvl="3"/>
             <a:r>
-              <a:rPr lang="en-US"/>
-              <a:t>Fourth level</a:t>
+              <a:rPr lang="nb-NO"/>
+              <a:t>Fjerde nivå</a:t>
             </a:r>
           </a:p>
           <a:p>
             <a:pPr lvl="4"/>
             <a:r>
-              <a:rPr lang="en-US"/>
-              <a:t>Fifth level</a:t>
+              <a:rPr lang="nb-NO"/>
+              <a:t>Femte nivå</a:t>
             </a:r>
             <a:endParaRPr lang="en-US" dirty="0"/>
           </a:p>
@@ -1452,7 +1457,7 @@
           <a:p>
             <a:fld id="{2B324E1D-5BFC-4A26-948C-815C71133AD7}" type="datetimeFigureOut">
               <a:rPr lang="en-US" smtClean="0"/>
-              <a:t>10/25/2022</a:t>
+              <a:t>10/31/2022</a:t>
             </a:fld>
             <a:endParaRPr lang="en-US"/>
           </a:p>
@@ -1503,7 +1508,7 @@
     </p:spTree>
     <p:extLst>
       <p:ext uri="{BB962C8B-B14F-4D97-AF65-F5344CB8AC3E}">
-        <p14:creationId xmlns:p14="http://schemas.microsoft.com/office/powerpoint/2010/main" val="86274129"/>
+        <p14:creationId xmlns:p14="http://schemas.microsoft.com/office/powerpoint/2010/main" val="3843723328"/>
       </p:ext>
     </p:extLst>
   </p:cSld>
@@ -1515,7 +1520,7 @@
 
 <file path=ppt/slideLayouts/slideLayout5.xml><?xml version="1.0" encoding="utf-8"?>
 <p:sldLayout xmlns:a="http://schemas.openxmlformats.org/drawingml/2006/main" xmlns:r="http://schemas.openxmlformats.org/officeDocument/2006/relationships" xmlns:p="http://schemas.openxmlformats.org/presentationml/2006/main" type="twoTxTwoObj" preserve="1">
-  <p:cSld name="Comparison">
+  <p:cSld name="Sammenligning">
     <p:spTree>
       <p:nvGrpSpPr>
         <p:cNvPr id="1" name=""/>
@@ -1546,8 +1551,8 @@
           <a:lstStyle/>
           <a:p>
             <a:r>
-              <a:rPr lang="en-US"/>
-              <a:t>Click to edit Master title style</a:t>
+              <a:rPr lang="nb-NO"/>
+              <a:t>Klikk for å redigere tittelstil</a:t>
             </a:r>
             <a:endParaRPr lang="en-US" dirty="0"/>
           </a:p>
@@ -1621,8 +1626,8 @@
           <a:p>
             <a:pPr lvl="0"/>
             <a:r>
-              <a:rPr lang="en-US"/>
-              <a:t>Click to edit Master text styles</a:t>
+              <a:rPr lang="nb-NO"/>
+              <a:t>Klikk for å redigere tekststiler i malen</a:t>
             </a:r>
           </a:p>
         </p:txBody>
@@ -1677,36 +1682,36 @@
           <a:p>
             <a:pPr lvl="0"/>
             <a:r>
-              <a:rPr lang="en-US"/>
-              <a:t>Click to edit Master text styles</a:t>
+              <a:rPr lang="nb-NO"/>
+              <a:t>Klikk for å redigere tekststiler i malen</a:t>
             </a:r>
           </a:p>
           <a:p>
             <a:pPr lvl="1"/>
             <a:r>
-              <a:rPr lang="en-US"/>
-              <a:t>Second level</a:t>
+              <a:rPr lang="nb-NO"/>
+              <a:t>Andre nivå</a:t>
             </a:r>
           </a:p>
           <a:p>
             <a:pPr lvl="2"/>
             <a:r>
-              <a:rPr lang="en-US"/>
-              <a:t>Third level</a:t>
+              <a:rPr lang="nb-NO"/>
+              <a:t>Tredje nivå</a:t>
             </a:r>
           </a:p>
           <a:p>
             <a:pPr lvl="3"/>
             <a:r>
-              <a:rPr lang="en-US"/>
-              <a:t>Fourth level</a:t>
+              <a:rPr lang="nb-NO"/>
+              <a:t>Fjerde nivå</a:t>
             </a:r>
           </a:p>
           <a:p>
             <a:pPr lvl="4"/>
             <a:r>
-              <a:rPr lang="en-US"/>
-              <a:t>Fifth level</a:t>
+              <a:rPr lang="nb-NO"/>
+              <a:t>Femte nivå</a:t>
             </a:r>
             <a:endParaRPr lang="en-US" dirty="0"/>
           </a:p>
@@ -1795,8 +1800,8 @@
               <a:buNone/>
             </a:pPr>
             <a:r>
-              <a:rPr lang="en-US"/>
-              <a:t>Click to edit Master text styles</a:t>
+              <a:rPr lang="nb-NO"/>
+              <a:t>Klikk for å redigere tekststiler i malen</a:t>
             </a:r>
           </a:p>
         </p:txBody>
@@ -1851,36 +1856,36 @@
           <a:p>
             <a:pPr lvl="0"/>
             <a:r>
-              <a:rPr lang="en-US"/>
-              <a:t>Click to edit Master text styles</a:t>
+              <a:rPr lang="nb-NO"/>
+              <a:t>Klikk for å redigere tekststiler i malen</a:t>
             </a:r>
           </a:p>
           <a:p>
             <a:pPr lvl="1"/>
             <a:r>
-              <a:rPr lang="en-US"/>
-              <a:t>Second level</a:t>
+              <a:rPr lang="nb-NO"/>
+              <a:t>Andre nivå</a:t>
             </a:r>
           </a:p>
           <a:p>
             <a:pPr lvl="2"/>
             <a:r>
-              <a:rPr lang="en-US"/>
-              <a:t>Third level</a:t>
+              <a:rPr lang="nb-NO"/>
+              <a:t>Tredje nivå</a:t>
             </a:r>
           </a:p>
           <a:p>
             <a:pPr lvl="3"/>
             <a:r>
-              <a:rPr lang="en-US"/>
-              <a:t>Fourth level</a:t>
+              <a:rPr lang="nb-NO"/>
+              <a:t>Fjerde nivå</a:t>
             </a:r>
           </a:p>
           <a:p>
             <a:pPr lvl="4"/>
             <a:r>
-              <a:rPr lang="en-US"/>
-              <a:t>Fifth level</a:t>
+              <a:rPr lang="nb-NO"/>
+              <a:t>Femte nivå</a:t>
             </a:r>
             <a:endParaRPr lang="en-US" dirty="0"/>
           </a:p>
@@ -1903,7 +1908,7 @@
           <a:p>
             <a:fld id="{2B324E1D-5BFC-4A26-948C-815C71133AD7}" type="datetimeFigureOut">
               <a:rPr lang="en-US" smtClean="0"/>
-              <a:t>10/25/2022</a:t>
+              <a:t>10/31/2022</a:t>
             </a:fld>
             <a:endParaRPr lang="en-US"/>
           </a:p>
@@ -1954,7 +1959,7 @@
     </p:spTree>
     <p:extLst>
       <p:ext uri="{BB962C8B-B14F-4D97-AF65-F5344CB8AC3E}">
-        <p14:creationId xmlns:p14="http://schemas.microsoft.com/office/powerpoint/2010/main" val="4250533207"/>
+        <p14:creationId xmlns:p14="http://schemas.microsoft.com/office/powerpoint/2010/main" val="3714789659"/>
       </p:ext>
     </p:extLst>
   </p:cSld>
@@ -1966,7 +1971,7 @@
 
 <file path=ppt/slideLayouts/slideLayout6.xml><?xml version="1.0" encoding="utf-8"?>
 <p:sldLayout xmlns:a="http://schemas.openxmlformats.org/drawingml/2006/main" xmlns:r="http://schemas.openxmlformats.org/officeDocument/2006/relationships" xmlns:p="http://schemas.openxmlformats.org/presentationml/2006/main" type="titleOnly" preserve="1">
-  <p:cSld name="Title Only">
+  <p:cSld name="Bare tittel">
     <p:spTree>
       <p:nvGrpSpPr>
         <p:cNvPr id="1" name=""/>
@@ -1997,8 +2002,8 @@
           <a:lstStyle/>
           <a:p>
             <a:r>
-              <a:rPr lang="en-US"/>
-              <a:t>Click to edit Master title style</a:t>
+              <a:rPr lang="nb-NO"/>
+              <a:t>Klikk for å redigere tittelstil</a:t>
             </a:r>
             <a:endParaRPr lang="en-US" dirty="0"/>
           </a:p>
@@ -2021,7 +2026,7 @@
           <a:p>
             <a:fld id="{2B324E1D-5BFC-4A26-948C-815C71133AD7}" type="datetimeFigureOut">
               <a:rPr lang="en-US" smtClean="0"/>
-              <a:t>10/25/2022</a:t>
+              <a:t>10/31/2022</a:t>
             </a:fld>
             <a:endParaRPr lang="en-US"/>
           </a:p>
@@ -2072,7 +2077,7 @@
     </p:spTree>
     <p:extLst>
       <p:ext uri="{BB962C8B-B14F-4D97-AF65-F5344CB8AC3E}">
-        <p14:creationId xmlns:p14="http://schemas.microsoft.com/office/powerpoint/2010/main" val="573716345"/>
+        <p14:creationId xmlns:p14="http://schemas.microsoft.com/office/powerpoint/2010/main" val="2459390843"/>
       </p:ext>
     </p:extLst>
   </p:cSld>
@@ -2084,7 +2089,7 @@
 
 <file path=ppt/slideLayouts/slideLayout7.xml><?xml version="1.0" encoding="utf-8"?>
 <p:sldLayout xmlns:a="http://schemas.openxmlformats.org/drawingml/2006/main" xmlns:r="http://schemas.openxmlformats.org/officeDocument/2006/relationships" xmlns:p="http://schemas.openxmlformats.org/presentationml/2006/main" type="blank" preserve="1">
-  <p:cSld name="Blank">
+  <p:cSld name="Tomt">
     <p:spTree>
       <p:nvGrpSpPr>
         <p:cNvPr id="1" name=""/>
@@ -2116,7 +2121,7 @@
           <a:p>
             <a:fld id="{2B324E1D-5BFC-4A26-948C-815C71133AD7}" type="datetimeFigureOut">
               <a:rPr lang="en-US" smtClean="0"/>
-              <a:t>10/25/2022</a:t>
+              <a:t>10/31/2022</a:t>
             </a:fld>
             <a:endParaRPr lang="en-US"/>
           </a:p>
@@ -2167,7 +2172,7 @@
     </p:spTree>
     <p:extLst>
       <p:ext uri="{BB962C8B-B14F-4D97-AF65-F5344CB8AC3E}">
-        <p14:creationId xmlns:p14="http://schemas.microsoft.com/office/powerpoint/2010/main" val="2047510797"/>
+        <p14:creationId xmlns:p14="http://schemas.microsoft.com/office/powerpoint/2010/main" val="3819644959"/>
       </p:ext>
     </p:extLst>
   </p:cSld>
@@ -2179,7 +2184,7 @@
 
 <file path=ppt/slideLayouts/slideLayout8.xml><?xml version="1.0" encoding="utf-8"?>
 <p:sldLayout xmlns:a="http://schemas.openxmlformats.org/drawingml/2006/main" xmlns:r="http://schemas.openxmlformats.org/officeDocument/2006/relationships" xmlns:p="http://schemas.openxmlformats.org/presentationml/2006/main" type="objTx" preserve="1">
-  <p:cSld name="Content with Caption">
+  <p:cSld name="Innhold med tekst">
     <p:spTree>
       <p:nvGrpSpPr>
         <p:cNvPr id="1" name=""/>
@@ -2221,8 +2226,8 @@
           </a:lstStyle>
           <a:p>
             <a:r>
-              <a:rPr lang="en-US"/>
-              <a:t>Click to edit Master title style</a:t>
+              <a:rPr lang="nb-NO"/>
+              <a:t>Klikk for å redigere tittelstil</a:t>
             </a:r>
             <a:endParaRPr lang="en-US" dirty="0"/>
           </a:p>
@@ -2278,36 +2283,36 @@
           <a:p>
             <a:pPr lvl="0"/>
             <a:r>
-              <a:rPr lang="en-US"/>
-              <a:t>Click to edit Master text styles</a:t>
+              <a:rPr lang="nb-NO"/>
+              <a:t>Klikk for å redigere tekststiler i malen</a:t>
             </a:r>
           </a:p>
           <a:p>
             <a:pPr lvl="1"/>
             <a:r>
-              <a:rPr lang="en-US"/>
-              <a:t>Second level</a:t>
+              <a:rPr lang="nb-NO"/>
+              <a:t>Andre nivå</a:t>
             </a:r>
           </a:p>
           <a:p>
             <a:pPr lvl="2"/>
             <a:r>
-              <a:rPr lang="en-US"/>
-              <a:t>Third level</a:t>
+              <a:rPr lang="nb-NO"/>
+              <a:t>Tredje nivå</a:t>
             </a:r>
           </a:p>
           <a:p>
             <a:pPr lvl="3"/>
             <a:r>
-              <a:rPr lang="en-US"/>
-              <a:t>Fourth level</a:t>
+              <a:rPr lang="nb-NO"/>
+              <a:t>Fjerde nivå</a:t>
             </a:r>
           </a:p>
           <a:p>
             <a:pPr lvl="4"/>
             <a:r>
-              <a:rPr lang="en-US"/>
-              <a:t>Fifth level</a:t>
+              <a:rPr lang="nb-NO"/>
+              <a:t>Femte nivå</a:t>
             </a:r>
             <a:endParaRPr lang="en-US" dirty="0"/>
           </a:p>
@@ -2380,8 +2385,8 @@
           <a:p>
             <a:pPr lvl="0"/>
             <a:r>
-              <a:rPr lang="en-US"/>
-              <a:t>Click to edit Master text styles</a:t>
+              <a:rPr lang="nb-NO"/>
+              <a:t>Klikk for å redigere tekststiler i malen</a:t>
             </a:r>
           </a:p>
         </p:txBody>
@@ -2403,7 +2408,7 @@
           <a:p>
             <a:fld id="{2B324E1D-5BFC-4A26-948C-815C71133AD7}" type="datetimeFigureOut">
               <a:rPr lang="en-US" smtClean="0"/>
-              <a:t>10/25/2022</a:t>
+              <a:t>10/31/2022</a:t>
             </a:fld>
             <a:endParaRPr lang="en-US"/>
           </a:p>
@@ -2454,7 +2459,7 @@
     </p:spTree>
     <p:extLst>
       <p:ext uri="{BB962C8B-B14F-4D97-AF65-F5344CB8AC3E}">
-        <p14:creationId xmlns:p14="http://schemas.microsoft.com/office/powerpoint/2010/main" val="1985659513"/>
+        <p14:creationId xmlns:p14="http://schemas.microsoft.com/office/powerpoint/2010/main" val="2572474412"/>
       </p:ext>
     </p:extLst>
   </p:cSld>
@@ -2466,7 +2471,7 @@
 
 <file path=ppt/slideLayouts/slideLayout9.xml><?xml version="1.0" encoding="utf-8"?>
 <p:sldLayout xmlns:a="http://schemas.openxmlformats.org/drawingml/2006/main" xmlns:r="http://schemas.openxmlformats.org/officeDocument/2006/relationships" xmlns:p="http://schemas.openxmlformats.org/presentationml/2006/main" type="picTx" preserve="1">
-  <p:cSld name="Picture with Caption">
+  <p:cSld name="Bilde med tekst">
     <p:spTree>
       <p:nvGrpSpPr>
         <p:cNvPr id="1" name=""/>
@@ -2550,8 +2555,8 @@
           </a:lstStyle>
           <a:p>
             <a:r>
-              <a:rPr lang="en-US"/>
-              <a:t>Click to edit Master title style</a:t>
+              <a:rPr lang="nb-NO"/>
+              <a:t>Klikk for å redigere tittelstil</a:t>
             </a:r>
             <a:endParaRPr lang="en-US" dirty="0"/>
           </a:p>
@@ -2622,8 +2627,8 @@
           </a:lstStyle>
           <a:p>
             <a:r>
-              <a:rPr lang="en-US"/>
-              <a:t>Click icon to add picture</a:t>
+              <a:rPr lang="nb-NO"/>
+              <a:t>Klikk på ikonet for å legge til et bilde</a:t>
             </a:r>
             <a:endParaRPr lang="en-US" dirty="0"/>
           </a:p>
@@ -2702,8 +2707,8 @@
           <a:p>
             <a:pPr lvl="0"/>
             <a:r>
-              <a:rPr lang="en-US"/>
-              <a:t>Click to edit Master text styles</a:t>
+              <a:rPr lang="nb-NO"/>
+              <a:t>Klikk for å redigere tekststiler i malen</a:t>
             </a:r>
           </a:p>
         </p:txBody>
@@ -2725,7 +2730,7 @@
           <a:p>
             <a:fld id="{2B324E1D-5BFC-4A26-948C-815C71133AD7}" type="datetimeFigureOut">
               <a:rPr lang="en-US" smtClean="0"/>
-              <a:t>10/25/2022</a:t>
+              <a:t>10/31/2022</a:t>
             </a:fld>
             <a:endParaRPr lang="en-US"/>
           </a:p>
@@ -2776,7 +2781,7 @@
     </p:spTree>
     <p:extLst>
       <p:ext uri="{BB962C8B-B14F-4D97-AF65-F5344CB8AC3E}">
-        <p14:creationId xmlns:p14="http://schemas.microsoft.com/office/powerpoint/2010/main" val="1645434160"/>
+        <p14:creationId xmlns:p14="http://schemas.microsoft.com/office/powerpoint/2010/main" val="3396202165"/>
       </p:ext>
     </p:extLst>
   </p:cSld>
@@ -2874,8 +2879,8 @@
           <a:lstStyle/>
           <a:p>
             <a:r>
-              <a:rPr lang="en-US"/>
-              <a:t>Click to edit Master title style</a:t>
+              <a:rPr lang="nb-NO"/>
+              <a:t>Klikk for å redigere tittelstil</a:t>
             </a:r>
             <a:endParaRPr lang="en-US" dirty="0"/>
           </a:p>
@@ -2908,36 +2913,36 @@
           <a:p>
             <a:pPr lvl="0"/>
             <a:r>
-              <a:rPr lang="en-US"/>
-              <a:t>Click to edit Master text styles</a:t>
+              <a:rPr lang="nb-NO"/>
+              <a:t>Klikk for å redigere tekststiler i malen</a:t>
             </a:r>
           </a:p>
           <a:p>
             <a:pPr lvl="1"/>
             <a:r>
-              <a:rPr lang="en-US"/>
-              <a:t>Second level</a:t>
+              <a:rPr lang="nb-NO"/>
+              <a:t>Andre nivå</a:t>
             </a:r>
           </a:p>
           <a:p>
             <a:pPr lvl="2"/>
             <a:r>
-              <a:rPr lang="en-US"/>
-              <a:t>Third level</a:t>
+              <a:rPr lang="nb-NO"/>
+              <a:t>Tredje nivå</a:t>
             </a:r>
           </a:p>
           <a:p>
             <a:pPr lvl="3"/>
             <a:r>
-              <a:rPr lang="en-US"/>
-              <a:t>Fourth level</a:t>
+              <a:rPr lang="nb-NO"/>
+              <a:t>Fjerde nivå</a:t>
             </a:r>
           </a:p>
           <a:p>
             <a:pPr lvl="4"/>
             <a:r>
-              <a:rPr lang="en-US"/>
-              <a:t>Fifth level</a:t>
+              <a:rPr lang="nb-NO"/>
+              <a:t>Femte nivå</a:t>
             </a:r>
             <a:endParaRPr lang="en-US" dirty="0"/>
           </a:p>
@@ -2979,7 +2984,7 @@
           <a:p>
             <a:fld id="{2B324E1D-5BFC-4A26-948C-815C71133AD7}" type="datetimeFigureOut">
               <a:rPr lang="en-US" smtClean="0"/>
-              <a:t>10/25/2022</a:t>
+              <a:t>10/31/2022</a:t>
             </a:fld>
             <a:endParaRPr lang="en-US"/>
           </a:p>
@@ -3070,23 +3075,23 @@
     </p:spTree>
     <p:extLst>
       <p:ext uri="{BB962C8B-B14F-4D97-AF65-F5344CB8AC3E}">
-        <p14:creationId xmlns:p14="http://schemas.microsoft.com/office/powerpoint/2010/main" val="478362975"/>
+        <p14:creationId xmlns:p14="http://schemas.microsoft.com/office/powerpoint/2010/main" val="2083624275"/>
       </p:ext>
     </p:extLst>
   </p:cSld>
   <p:clrMap bg1="lt1" tx1="dk1" bg2="lt2" tx2="dk2" accent1="accent1" accent2="accent2" accent3="accent3" accent4="accent4" accent5="accent5" accent6="accent6" hlink="hlink" folHlink="folHlink"/>
   <p:sldLayoutIdLst>
-    <p:sldLayoutId id="2147483817" r:id="rId1"/>
-    <p:sldLayoutId id="2147483818" r:id="rId2"/>
-    <p:sldLayoutId id="2147483819" r:id="rId3"/>
-    <p:sldLayoutId id="2147483820" r:id="rId4"/>
-    <p:sldLayoutId id="2147483821" r:id="rId5"/>
-    <p:sldLayoutId id="2147483822" r:id="rId6"/>
-    <p:sldLayoutId id="2147483823" r:id="rId7"/>
-    <p:sldLayoutId id="2147483824" r:id="rId8"/>
-    <p:sldLayoutId id="2147483825" r:id="rId9"/>
-    <p:sldLayoutId id="2147483826" r:id="rId10"/>
-    <p:sldLayoutId id="2147483827" r:id="rId11"/>
+    <p:sldLayoutId id="2147483856" r:id="rId1"/>
+    <p:sldLayoutId id="2147483857" r:id="rId2"/>
+    <p:sldLayoutId id="2147483858" r:id="rId3"/>
+    <p:sldLayoutId id="2147483859" r:id="rId4"/>
+    <p:sldLayoutId id="2147483860" r:id="rId5"/>
+    <p:sldLayoutId id="2147483861" r:id="rId6"/>
+    <p:sldLayoutId id="2147483862" r:id="rId7"/>
+    <p:sldLayoutId id="2147483863" r:id="rId8"/>
+    <p:sldLayoutId id="2147483864" r:id="rId9"/>
+    <p:sldLayoutId id="2147483865" r:id="rId10"/>
+    <p:sldLayoutId id="2147483866" r:id="rId11"/>
   </p:sldLayoutIdLst>
   <p:txStyles>
     <p:titleStyle>
@@ -3518,10 +3523,7 @@
           <a:bodyPr/>
           <a:lstStyle/>
           <a:p>
-            <a:r>
-              <a:rPr lang="en-US" noProof="0" dirty="0"/>
-              <a:t>Master’s thesis defense by Karl Henrik Fredly</a:t>
-            </a:r>
+            <a:endParaRPr lang="en-US" noProof="0" dirty="0"/>
           </a:p>
         </p:txBody>
       </p:sp>
@@ -3577,9 +3579,10 @@
           <a:lstStyle/>
           <a:p>
             <a:r>
-              <a:rPr lang="en-US" noProof="0" dirty="0"/>
+              <a:rPr lang="en-US" noProof="0"/>
               <a:t>Our trial wave function</a:t>
             </a:r>
+            <a:endParaRPr lang="en-US" noProof="0" dirty="0"/>
           </a:p>
         </p:txBody>
       </p:sp>
@@ -3604,7 +3607,7 @@
           <a:bodyPr/>
           <a:lstStyle/>
           <a:p>
-            <a:endParaRPr lang="en-US"/>
+            <a:endParaRPr lang="en-US" dirty="0"/>
           </a:p>
         </p:txBody>
       </p:sp>
@@ -4393,10 +4396,10 @@
       </p:grpSpPr>
       <p:sp>
         <p:nvSpPr>
-          <p:cNvPr id="2" name="Title 1">
+          <p:cNvPr id="2" name="Tittel 1">
             <a:extLst>
               <a:ext uri="{FF2B5EF4-FFF2-40B4-BE49-F238E27FC236}">
-                <a16:creationId xmlns:a16="http://schemas.microsoft.com/office/drawing/2014/main" id="{74043427-3212-635F-7412-AF4FEF5AD051}"/>
+                <a16:creationId xmlns:a16="http://schemas.microsoft.com/office/drawing/2014/main" id="{AD05931B-027F-F607-D453-E51343F31B8A}"/>
               </a:ext>
             </a:extLst>
           </p:cNvPr>
@@ -4413,18 +4416,19 @@
           <a:lstStyle/>
           <a:p>
             <a:r>
-              <a:rPr lang="en-US" noProof="0" dirty="0"/>
-              <a:t>Quantum Dots</a:t>
-            </a:r>
-          </a:p>
-        </p:txBody>
-      </p:sp>
-      <p:sp>
-        <p:nvSpPr>
-          <p:cNvPr id="3" name="Content Placeholder 2">
+              <a:rPr lang="nb-NO" dirty="0" err="1"/>
+              <a:t>Overview</a:t>
+            </a:r>
+            <a:endParaRPr lang="en-US" dirty="0"/>
+          </a:p>
+        </p:txBody>
+      </p:sp>
+      <p:sp>
+        <p:nvSpPr>
+          <p:cNvPr id="3" name="Plassholder for innhold 2">
             <a:extLst>
               <a:ext uri="{FF2B5EF4-FFF2-40B4-BE49-F238E27FC236}">
-                <a16:creationId xmlns:a16="http://schemas.microsoft.com/office/drawing/2014/main" id="{8678EA26-4E0A-756E-BB1D-C05A7B0651CF}"/>
+                <a16:creationId xmlns:a16="http://schemas.microsoft.com/office/drawing/2014/main" id="{F8A73E80-4057-AAE8-569E-9600E63383B5}"/>
               </a:ext>
             </a:extLst>
           </p:cNvPr>
@@ -4440,38 +4444,98 @@
           <a:bodyPr/>
           <a:lstStyle/>
           <a:p>
-            <a:r>
-              <a:rPr lang="nb-NO" dirty="0"/>
-              <a:t>Electrons </a:t>
-            </a:r>
-            <a:r>
-              <a:rPr lang="nb-NO" dirty="0" err="1"/>
-              <a:t>trapped</a:t>
-            </a:r>
-            <a:r>
-              <a:rPr lang="nb-NO" dirty="0"/>
-              <a:t> in a </a:t>
-            </a:r>
-            <a:r>
-              <a:rPr lang="nb-NO" dirty="0" err="1"/>
-              <a:t>Harmonic</a:t>
-            </a:r>
-            <a:r>
-              <a:rPr lang="nb-NO" dirty="0"/>
-              <a:t> </a:t>
-            </a:r>
-            <a:r>
-              <a:rPr lang="nb-NO"/>
-              <a:t>Potential</a:t>
-            </a:r>
-            <a:endParaRPr lang="en-US"/>
+            <a:pPr marL="0" indent="0">
+              <a:buNone/>
+            </a:pPr>
+            <a:r>
+              <a:rPr lang="en-US" sz="1800" noProof="0" dirty="0"/>
+              <a:t>   System we want to solve:</a:t>
+            </a:r>
+            <a:endParaRPr lang="en-US" sz="1800" b="1" noProof="0" dirty="0"/>
+          </a:p>
+          <a:p>
+            <a:r>
+              <a:rPr lang="en-US" sz="1800" b="1" noProof="0" dirty="0"/>
+              <a:t>Quantum Dots </a:t>
+            </a:r>
+            <a:r>
+              <a:rPr lang="en-US" sz="1800" noProof="0" dirty="0"/>
+              <a:t>- Trapped electrons</a:t>
+            </a:r>
+          </a:p>
+          <a:p>
+            <a:endParaRPr lang="en-US" sz="1800" noProof="0" dirty="0"/>
+          </a:p>
+          <a:p>
+            <a:pPr marL="0" indent="0">
+              <a:buNone/>
+            </a:pPr>
+            <a:r>
+              <a:rPr lang="en-US" dirty="0"/>
+              <a:t>   Methods we will use to solve it:</a:t>
+            </a:r>
+          </a:p>
+          <a:p>
+            <a:r>
+              <a:rPr lang="en-US" sz="1800" noProof="0" dirty="0"/>
+              <a:t>Hartree-</a:t>
+            </a:r>
+            <a:r>
+              <a:rPr lang="en-US" sz="1800" noProof="0" dirty="0" err="1"/>
+              <a:t>Fock</a:t>
+            </a:r>
+            <a:r>
+              <a:rPr lang="en-US" sz="1800" noProof="0" dirty="0"/>
+              <a:t> – Simple solution, useful starting point</a:t>
+            </a:r>
+          </a:p>
+          <a:p>
+            <a:r>
+              <a:rPr lang="en-US" b="1" dirty="0"/>
+              <a:t>Coupled Cluster </a:t>
+            </a:r>
+            <a:r>
+              <a:rPr lang="en-US" dirty="0"/>
+              <a:t>– Builds on Hartree-</a:t>
+            </a:r>
+            <a:r>
+              <a:rPr lang="en-US" dirty="0" err="1"/>
+              <a:t>Fock</a:t>
+            </a:r>
+            <a:r>
+              <a:rPr lang="en-US" dirty="0"/>
+              <a:t>, fast and accurate</a:t>
+            </a:r>
+            <a:endParaRPr lang="en-US" sz="1800" noProof="0" dirty="0"/>
+          </a:p>
+          <a:p>
+            <a:r>
+              <a:rPr lang="en-US" dirty="0"/>
+              <a:t>Variational Monte Carlo – Can optimize any function towards being a good solution: In our case a combination of Hartree-</a:t>
+            </a:r>
+            <a:r>
+              <a:rPr lang="en-US" dirty="0" err="1"/>
+              <a:t>Fock</a:t>
+            </a:r>
+            <a:r>
+              <a:rPr lang="en-US" dirty="0"/>
+              <a:t> and a </a:t>
+            </a:r>
+            <a:r>
+              <a:rPr lang="en-US" b="1" dirty="0"/>
+              <a:t>Neural Network</a:t>
+            </a:r>
+            <a:endParaRPr lang="en-US" sz="1800" b="1" noProof="0" dirty="0"/>
+          </a:p>
+          <a:p>
+            <a:endParaRPr lang="en-US" dirty="0"/>
           </a:p>
         </p:txBody>
       </p:sp>
     </p:spTree>
     <p:extLst>
       <p:ext uri="{BB962C8B-B14F-4D97-AF65-F5344CB8AC3E}">
-        <p14:creationId xmlns:p14="http://schemas.microsoft.com/office/powerpoint/2010/main" val="3443197157"/>
+        <p14:creationId xmlns:p14="http://schemas.microsoft.com/office/powerpoint/2010/main" val="3723907965"/>
       </p:ext>
     </p:extLst>
   </p:cSld>
@@ -4586,7 +4650,7 @@
           <p:cNvPr id="2" name="Title 1">
             <a:extLst>
               <a:ext uri="{FF2B5EF4-FFF2-40B4-BE49-F238E27FC236}">
-                <a16:creationId xmlns:a16="http://schemas.microsoft.com/office/drawing/2014/main" id="{1F7C74C9-6C68-F353-9856-8598C7746238}"/>
+                <a16:creationId xmlns:a16="http://schemas.microsoft.com/office/drawing/2014/main" id="{74043427-3212-635F-7412-AF4FEF5AD051}"/>
               </a:ext>
             </a:extLst>
           </p:cNvPr>
@@ -4604,7 +4668,7 @@
           <a:p>
             <a:r>
               <a:rPr lang="en-US" noProof="0" dirty="0"/>
-              <a:t>Coupled Cluster</a:t>
+              <a:t>Quantum Dots</a:t>
             </a:r>
           </a:p>
         </p:txBody>
@@ -4614,7 +4678,7 @@
           <p:cNvPr id="3" name="Content Placeholder 2">
             <a:extLst>
               <a:ext uri="{FF2B5EF4-FFF2-40B4-BE49-F238E27FC236}">
-                <a16:creationId xmlns:a16="http://schemas.microsoft.com/office/drawing/2014/main" id="{B5C213DA-2D7B-C2A2-A1B8-96767B69CB55}"/>
+                <a16:creationId xmlns:a16="http://schemas.microsoft.com/office/drawing/2014/main" id="{8678EA26-4E0A-756E-BB1D-C05A7B0651CF}"/>
               </a:ext>
             </a:extLst>
           </p:cNvPr>
@@ -4625,19 +4689,218 @@
             <p:ph idx="1"/>
           </p:nvPr>
         </p:nvSpPr>
-        <p:spPr/>
-        <p:txBody>
-          <a:bodyPr/>
-          <a:lstStyle/>
-          <a:p>
-            <a:endParaRPr lang="en-US"/>
-          </a:p>
-        </p:txBody>
-      </p:sp>
+        <p:spPr>
+          <a:xfrm>
+            <a:off x="1261872" y="1828800"/>
+            <a:ext cx="4392479" cy="4351337"/>
+          </a:xfrm>
+        </p:spPr>
+        <p:txBody>
+          <a:bodyPr/>
+          <a:lstStyle/>
+          <a:p>
+            <a:r>
+              <a:rPr lang="nb-NO" dirty="0"/>
+              <a:t>Electrons </a:t>
+            </a:r>
+            <a:r>
+              <a:rPr lang="nb-NO" dirty="0" err="1"/>
+              <a:t>trapped</a:t>
+            </a:r>
+            <a:r>
+              <a:rPr lang="nb-NO" dirty="0"/>
+              <a:t> in a </a:t>
+            </a:r>
+            <a:r>
+              <a:rPr lang="nb-NO" dirty="0" err="1"/>
+              <a:t>Harmonic</a:t>
+            </a:r>
+            <a:r>
+              <a:rPr lang="nb-NO" dirty="0"/>
+              <a:t> </a:t>
+            </a:r>
+            <a:r>
+              <a:rPr lang="nb-NO" dirty="0" err="1"/>
+              <a:t>Potential</a:t>
+            </a:r>
+            <a:br>
+              <a:rPr lang="nb-NO" dirty="0"/>
+            </a:br>
+            <a:r>
+              <a:rPr lang="nb-NO" dirty="0"/>
+              <a:t>- The </a:t>
+            </a:r>
+            <a:r>
+              <a:rPr lang="nb-NO" dirty="0" err="1"/>
+              <a:t>potential</a:t>
+            </a:r>
+            <a:r>
+              <a:rPr lang="nb-NO" dirty="0"/>
+              <a:t> pulls them in</a:t>
+            </a:r>
+            <a:br>
+              <a:rPr lang="nb-NO" dirty="0"/>
+            </a:br>
+            <a:r>
+              <a:rPr lang="nb-NO" dirty="0"/>
+              <a:t>- The electrons </a:t>
+            </a:r>
+            <a:r>
+              <a:rPr lang="nb-NO" dirty="0" err="1"/>
+              <a:t>repel</a:t>
+            </a:r>
+            <a:r>
+              <a:rPr lang="nb-NO" dirty="0"/>
+              <a:t> </a:t>
+            </a:r>
+            <a:r>
+              <a:rPr lang="nb-NO" dirty="0" err="1"/>
+              <a:t>each</a:t>
+            </a:r>
+            <a:r>
+              <a:rPr lang="nb-NO" dirty="0"/>
+              <a:t> </a:t>
+            </a:r>
+            <a:r>
+              <a:rPr lang="nb-NO" dirty="0" err="1"/>
+              <a:t>other</a:t>
+            </a:r>
+            <a:endParaRPr lang="nb-NO" dirty="0"/>
+          </a:p>
+          <a:p>
+            <a:r>
+              <a:rPr lang="nb-NO" dirty="0"/>
+              <a:t>Good </a:t>
+            </a:r>
+            <a:r>
+              <a:rPr lang="nb-NO" dirty="0" err="1"/>
+              <a:t>approximation</a:t>
+            </a:r>
+            <a:r>
+              <a:rPr lang="nb-NO" dirty="0"/>
+              <a:t> to </a:t>
+            </a:r>
+            <a:r>
+              <a:rPr lang="nb-NO" dirty="0" err="1"/>
+              <a:t>other</a:t>
+            </a:r>
+            <a:r>
+              <a:rPr lang="nb-NO" dirty="0"/>
+              <a:t> </a:t>
+            </a:r>
+            <a:r>
+              <a:rPr lang="nb-NO" dirty="0" err="1"/>
+              <a:t>potentials</a:t>
+            </a:r>
+            <a:endParaRPr lang="nb-NO" dirty="0"/>
+          </a:p>
+          <a:p>
+            <a:r>
+              <a:rPr lang="nb-NO" dirty="0"/>
+              <a:t>Non-</a:t>
+            </a:r>
+            <a:r>
+              <a:rPr lang="nb-NO" dirty="0" err="1"/>
+              <a:t>interacting</a:t>
+            </a:r>
+            <a:r>
+              <a:rPr lang="nb-NO" dirty="0"/>
+              <a:t> case has an </a:t>
+            </a:r>
+            <a:r>
+              <a:rPr lang="nb-NO" dirty="0" err="1"/>
+              <a:t>exact</a:t>
+            </a:r>
+            <a:r>
+              <a:rPr lang="nb-NO" dirty="0"/>
+              <a:t> </a:t>
+            </a:r>
+            <a:r>
+              <a:rPr lang="nb-NO" dirty="0" err="1"/>
+              <a:t>analytical</a:t>
+            </a:r>
+            <a:r>
+              <a:rPr lang="nb-NO" dirty="0"/>
+              <a:t> </a:t>
+            </a:r>
+            <a:r>
+              <a:rPr lang="nb-NO" dirty="0" err="1"/>
+              <a:t>solution</a:t>
+            </a:r>
+            <a:endParaRPr lang="nb-NO" dirty="0"/>
+          </a:p>
+        </p:txBody>
+      </p:sp>
+      <p:pic>
+        <p:nvPicPr>
+          <p:cNvPr id="6" name="Bilde 5">
+            <a:extLst>
+              <a:ext uri="{FF2B5EF4-FFF2-40B4-BE49-F238E27FC236}">
+                <a16:creationId xmlns:a16="http://schemas.microsoft.com/office/drawing/2014/main" id="{9D9EE489-605E-42AB-9257-D01A17663F65}"/>
+              </a:ext>
+            </a:extLst>
+          </p:cNvPr>
+          <p:cNvPicPr>
+            <a:picLocks noChangeAspect="1"/>
+          </p:cNvPicPr>
+          <p:nvPr/>
+        </p:nvPicPr>
+        <p:blipFill>
+          <a:blip r:embed="rId2">
+            <a:extLst>
+              <a:ext uri="{28A0092B-C50C-407E-A947-70E740481C1C}">
+                <a14:useLocalDpi xmlns:a14="http://schemas.microsoft.com/office/drawing/2010/main" val="0"/>
+              </a:ext>
+            </a:extLst>
+          </a:blip>
+          <a:stretch>
+            <a:fillRect/>
+          </a:stretch>
+        </p:blipFill>
+        <p:spPr>
+          <a:xfrm>
+            <a:off x="6108192" y="3051626"/>
+            <a:ext cx="4324055" cy="2882703"/>
+          </a:xfrm>
+          <a:prstGeom prst="rect">
+            <a:avLst/>
+          </a:prstGeom>
+        </p:spPr>
+      </p:pic>
+      <p:pic>
+        <p:nvPicPr>
+          <p:cNvPr id="21" name="Bilde 20">
+            <a:extLst>
+              <a:ext uri="{FF2B5EF4-FFF2-40B4-BE49-F238E27FC236}">
+                <a16:creationId xmlns:a16="http://schemas.microsoft.com/office/drawing/2014/main" id="{B7372A06-10EC-CF47-63B9-1DDC9F6F71D7}"/>
+              </a:ext>
+            </a:extLst>
+          </p:cNvPr>
+          <p:cNvPicPr>
+            <a:picLocks noChangeAspect="1"/>
+          </p:cNvPicPr>
+          <p:nvPr/>
+        </p:nvPicPr>
+        <p:blipFill>
+          <a:blip r:embed="rId3"/>
+          <a:stretch>
+            <a:fillRect/>
+          </a:stretch>
+        </p:blipFill>
+        <p:spPr>
+          <a:xfrm>
+            <a:off x="5654351" y="1828800"/>
+            <a:ext cx="1262280" cy="977019"/>
+          </a:xfrm>
+          <a:prstGeom prst="rect">
+            <a:avLst/>
+          </a:prstGeom>
+        </p:spPr>
+      </p:pic>
     </p:spTree>
     <p:extLst>
       <p:ext uri="{BB962C8B-B14F-4D97-AF65-F5344CB8AC3E}">
-        <p14:creationId xmlns:p14="http://schemas.microsoft.com/office/powerpoint/2010/main" val="2550532346"/>
+        <p14:creationId xmlns:p14="http://schemas.microsoft.com/office/powerpoint/2010/main" val="3443197157"/>
       </p:ext>
     </p:extLst>
   </p:cSld>
@@ -4669,7 +4932,7 @@
           <p:cNvPr id="2" name="Title 1">
             <a:extLst>
               <a:ext uri="{FF2B5EF4-FFF2-40B4-BE49-F238E27FC236}">
-                <a16:creationId xmlns:a16="http://schemas.microsoft.com/office/drawing/2014/main" id="{B1E12DC7-49F9-A6C7-D63E-2221E2EB5EDB}"/>
+                <a16:creationId xmlns:a16="http://schemas.microsoft.com/office/drawing/2014/main" id="{224F0C93-FA87-15B9-97AE-671E52E36DA0}"/>
               </a:ext>
             </a:extLst>
           </p:cNvPr>
@@ -4687,8 +4950,13 @@
           <a:p>
             <a:r>
               <a:rPr lang="en-US" noProof="0" dirty="0"/>
-              <a:t>Neural Networks</a:t>
-            </a:r>
+              <a:t>The </a:t>
+            </a:r>
+            <a:r>
+              <a:rPr lang="en-US" dirty="0"/>
+              <a:t>Equation we want to solve</a:t>
+            </a:r>
+            <a:endParaRPr lang="en-US" noProof="0" dirty="0"/>
           </a:p>
         </p:txBody>
       </p:sp>
@@ -4697,7 +4965,7 @@
           <p:cNvPr id="3" name="Content Placeholder 2">
             <a:extLst>
               <a:ext uri="{FF2B5EF4-FFF2-40B4-BE49-F238E27FC236}">
-                <a16:creationId xmlns:a16="http://schemas.microsoft.com/office/drawing/2014/main" id="{2DE65328-0DD8-ECCA-A842-DBF06975A1B9}"/>
+                <a16:creationId xmlns:a16="http://schemas.microsoft.com/office/drawing/2014/main" id="{97BA2941-F018-5D42-C555-DD83118D9A89}"/>
               </a:ext>
             </a:extLst>
           </p:cNvPr>
@@ -4713,14 +4981,144 @@
           <a:bodyPr/>
           <a:lstStyle/>
           <a:p>
-            <a:endParaRPr lang="en-US"/>
-          </a:p>
-        </p:txBody>
-      </p:sp>
+            <a:r>
+              <a:rPr lang="nb-NO" dirty="0"/>
+              <a:t>The time-</a:t>
+            </a:r>
+            <a:r>
+              <a:rPr lang="nb-NO" dirty="0" err="1"/>
+              <a:t>independent</a:t>
+            </a:r>
+            <a:r>
+              <a:rPr lang="nb-NO" dirty="0"/>
+              <a:t> </a:t>
+            </a:r>
+            <a:r>
+              <a:rPr lang="nb-NO" dirty="0" err="1"/>
+              <a:t>electronic</a:t>
+            </a:r>
+            <a:r>
+              <a:rPr lang="nb-NO" dirty="0"/>
+              <a:t> </a:t>
+            </a:r>
+            <a:r>
+              <a:rPr lang="nb-NO" dirty="0" err="1"/>
+              <a:t>Schrödinger</a:t>
+            </a:r>
+            <a:r>
+              <a:rPr lang="nb-NO" dirty="0"/>
+              <a:t> </a:t>
+            </a:r>
+            <a:r>
+              <a:rPr lang="nb-NO" dirty="0" err="1"/>
+              <a:t>equation</a:t>
+            </a:r>
+            <a:endParaRPr lang="en-US" dirty="0"/>
+          </a:p>
+          <a:p>
+            <a:endParaRPr lang="en-US" dirty="0"/>
+          </a:p>
+          <a:p>
+            <a:endParaRPr lang="en-US" dirty="0"/>
+          </a:p>
+          <a:p>
+            <a:endParaRPr lang="en-US" dirty="0"/>
+          </a:p>
+          <a:p>
+            <a:endParaRPr lang="en-US" dirty="0"/>
+          </a:p>
+          <a:p>
+            <a:endParaRPr lang="en-US" dirty="0"/>
+          </a:p>
+          <a:p>
+            <a:r>
+              <a:rPr lang="en-US" dirty="0"/>
+              <a:t>The variational method</a:t>
+            </a:r>
+            <a:br>
+              <a:rPr lang="en-US" dirty="0"/>
+            </a:br>
+            <a:r>
+              <a:rPr lang="en-US" dirty="0"/>
+              <a:t>- Trial wave function</a:t>
+            </a:r>
+            <a:br>
+              <a:rPr lang="en-US" dirty="0"/>
+            </a:br>
+            <a:r>
+              <a:rPr lang="en-US" dirty="0"/>
+              <a:t>- Optimization</a:t>
+            </a:r>
+          </a:p>
+          <a:p>
+            <a:endParaRPr lang="en-US" dirty="0"/>
+          </a:p>
+        </p:txBody>
+      </p:sp>
+      <p:pic>
+        <p:nvPicPr>
+          <p:cNvPr id="5" name="Bilde 4">
+            <a:extLst>
+              <a:ext uri="{FF2B5EF4-FFF2-40B4-BE49-F238E27FC236}">
+                <a16:creationId xmlns:a16="http://schemas.microsoft.com/office/drawing/2014/main" id="{A926737E-0CE9-CB30-07AF-10945535551E}"/>
+              </a:ext>
+            </a:extLst>
+          </p:cNvPr>
+          <p:cNvPicPr>
+            <a:picLocks noChangeAspect="1"/>
+          </p:cNvPicPr>
+          <p:nvPr/>
+        </p:nvPicPr>
+        <p:blipFill>
+          <a:blip r:embed="rId2"/>
+          <a:stretch>
+            <a:fillRect/>
+          </a:stretch>
+        </p:blipFill>
+        <p:spPr>
+          <a:xfrm>
+            <a:off x="2033783" y="2706049"/>
+            <a:ext cx="5818794" cy="1766420"/>
+          </a:xfrm>
+          <a:prstGeom prst="rect">
+            <a:avLst/>
+          </a:prstGeom>
+        </p:spPr>
+      </p:pic>
+      <p:pic>
+        <p:nvPicPr>
+          <p:cNvPr id="7" name="Bilde 6">
+            <a:extLst>
+              <a:ext uri="{FF2B5EF4-FFF2-40B4-BE49-F238E27FC236}">
+                <a16:creationId xmlns:a16="http://schemas.microsoft.com/office/drawing/2014/main" id="{F2C5ED5E-30AE-0817-DF36-D3E6EB898F37}"/>
+              </a:ext>
+            </a:extLst>
+          </p:cNvPr>
+          <p:cNvPicPr>
+            <a:picLocks noChangeAspect="1"/>
+          </p:cNvPicPr>
+          <p:nvPr/>
+        </p:nvPicPr>
+        <p:blipFill>
+          <a:blip r:embed="rId3"/>
+          <a:stretch>
+            <a:fillRect/>
+          </a:stretch>
+        </p:blipFill>
+        <p:spPr>
+          <a:xfrm>
+            <a:off x="3538547" y="2142865"/>
+            <a:ext cx="2809266" cy="904270"/>
+          </a:xfrm>
+          <a:prstGeom prst="rect">
+            <a:avLst/>
+          </a:prstGeom>
+        </p:spPr>
+      </p:pic>
     </p:spTree>
     <p:extLst>
       <p:ext uri="{BB962C8B-B14F-4D97-AF65-F5344CB8AC3E}">
-        <p14:creationId xmlns:p14="http://schemas.microsoft.com/office/powerpoint/2010/main" val="2236621290"/>
+        <p14:creationId xmlns:p14="http://schemas.microsoft.com/office/powerpoint/2010/main" val="2448575732"/>
       </p:ext>
     </p:extLst>
   </p:cSld>
@@ -4793,10 +5191,98 @@
         </p:nvSpPr>
         <p:spPr/>
         <p:txBody>
-          <a:bodyPr/>
-          <a:lstStyle/>
-          <a:p>
-            <a:endParaRPr lang="en-US"/>
+          <a:bodyPr>
+            <a:normAutofit/>
+          </a:bodyPr>
+          <a:lstStyle/>
+          <a:p>
+            <a:pPr marL="342900" indent="-342900">
+              <a:buFont typeface="+mj-lt"/>
+              <a:buAutoNum type="arabicPeriod"/>
+            </a:pPr>
+            <a:r>
+              <a:rPr lang="en-GB" sz="2400" dirty="0"/>
+              <a:t>Implement a variational Monte Carlo code combining the Hartree-</a:t>
+            </a:r>
+            <a:r>
+              <a:rPr lang="en-GB" sz="2400" dirty="0" err="1"/>
+              <a:t>Fock</a:t>
+            </a:r>
+            <a:r>
+              <a:rPr lang="en-GB" sz="2400" dirty="0"/>
+              <a:t> solution with a neural network</a:t>
+            </a:r>
+            <a:endParaRPr lang="nb-NO" sz="2400" dirty="0"/>
+          </a:p>
+          <a:p>
+            <a:pPr marL="342900" indent="-342900">
+              <a:buFont typeface="+mj-lt"/>
+              <a:buAutoNum type="arabicPeriod"/>
+            </a:pPr>
+            <a:r>
+              <a:rPr lang="nb-NO" sz="2400" dirty="0" err="1"/>
+              <a:t>Implement</a:t>
+            </a:r>
+            <a:r>
+              <a:rPr lang="nb-NO" sz="2400" dirty="0"/>
+              <a:t> </a:t>
+            </a:r>
+            <a:r>
+              <a:rPr lang="nb-NO" sz="2400" dirty="0" err="1"/>
+              <a:t>the</a:t>
+            </a:r>
+            <a:r>
+              <a:rPr lang="nb-NO" sz="2400" dirty="0"/>
+              <a:t> </a:t>
+            </a:r>
+            <a:r>
+              <a:rPr lang="nb-NO" sz="2400" dirty="0" err="1"/>
+              <a:t>Hartree-Fock</a:t>
+            </a:r>
+            <a:r>
+              <a:rPr lang="nb-NO" sz="2400" dirty="0"/>
+              <a:t> and </a:t>
+            </a:r>
+            <a:r>
+              <a:rPr lang="nb-NO" sz="2400" dirty="0" err="1"/>
+              <a:t>Coupled</a:t>
+            </a:r>
+            <a:r>
+              <a:rPr lang="nb-NO" sz="2400" dirty="0"/>
+              <a:t> Cluster </a:t>
+            </a:r>
+            <a:r>
+              <a:rPr lang="nb-NO" sz="2400" dirty="0" err="1"/>
+              <a:t>methods</a:t>
+            </a:r>
+            <a:endParaRPr lang="nb-NO" sz="2400" dirty="0"/>
+          </a:p>
+          <a:p>
+            <a:pPr marL="342900" indent="-342900">
+              <a:buFont typeface="+mj-lt"/>
+              <a:buAutoNum type="arabicPeriod"/>
+            </a:pPr>
+            <a:r>
+              <a:rPr lang="nb-NO" sz="2400" dirty="0"/>
+              <a:t>Make </a:t>
+            </a:r>
+            <a:r>
+              <a:rPr lang="nb-NO" sz="2400" dirty="0" err="1"/>
+              <a:t>the</a:t>
+            </a:r>
+            <a:r>
+              <a:rPr lang="nb-NO" sz="2400" dirty="0"/>
+              <a:t> </a:t>
+            </a:r>
+            <a:r>
+              <a:rPr lang="nb-NO" sz="2400" dirty="0" err="1"/>
+              <a:t>code</a:t>
+            </a:r>
+            <a:r>
+              <a:rPr lang="nb-NO" sz="2400" dirty="0"/>
+              <a:t> really fast</a:t>
+            </a:r>
+            <a:endParaRPr lang="en-US" sz="2400" dirty="0"/>
           </a:p>
         </p:txBody>
       </p:sp>
@@ -4835,7 +5321,7 @@
           <p:cNvPr id="2" name="Title 1">
             <a:extLst>
               <a:ext uri="{FF2B5EF4-FFF2-40B4-BE49-F238E27FC236}">
-                <a16:creationId xmlns:a16="http://schemas.microsoft.com/office/drawing/2014/main" id="{224F0C93-FA87-15B9-97AE-671E52E36DA0}"/>
+                <a16:creationId xmlns:a16="http://schemas.microsoft.com/office/drawing/2014/main" id="{E82202D1-0B2A-0631-54E7-EF7887D8B123}"/>
               </a:ext>
             </a:extLst>
           </p:cNvPr>
@@ -4853,7 +5339,15 @@
           <a:p>
             <a:r>
               <a:rPr lang="en-US" noProof="0" dirty="0"/>
-              <a:t>The Schrödinger Equation</a:t>
+              <a:t>The Hartree-</a:t>
+            </a:r>
+            <a:r>
+              <a:rPr lang="en-US" noProof="0" dirty="0" err="1"/>
+              <a:t>Fock</a:t>
+            </a:r>
+            <a:r>
+              <a:rPr lang="en-US" noProof="0" dirty="0"/>
+              <a:t> Method</a:t>
             </a:r>
           </a:p>
         </p:txBody>
@@ -4863,7 +5357,7 @@
           <p:cNvPr id="3" name="Content Placeholder 2">
             <a:extLst>
               <a:ext uri="{FF2B5EF4-FFF2-40B4-BE49-F238E27FC236}">
-                <a16:creationId xmlns:a16="http://schemas.microsoft.com/office/drawing/2014/main" id="{97BA2941-F018-5D42-C555-DD83118D9A89}"/>
+                <a16:creationId xmlns:a16="http://schemas.microsoft.com/office/drawing/2014/main" id="{8635EFA5-0FFF-D7A1-0200-12AEBCCFABFF}"/>
               </a:ext>
             </a:extLst>
           </p:cNvPr>
@@ -4879,14 +5373,97 @@
           <a:bodyPr/>
           <a:lstStyle/>
           <a:p>
-            <a:endParaRPr lang="en-US"/>
-          </a:p>
-        </p:txBody>
-      </p:sp>
+            <a:r>
+              <a:rPr lang="nb-NO" dirty="0"/>
+              <a:t>A single </a:t>
+            </a:r>
+            <a:r>
+              <a:rPr lang="nb-NO" dirty="0" err="1"/>
+              <a:t>Slater</a:t>
+            </a:r>
+            <a:r>
+              <a:rPr lang="nb-NO" dirty="0"/>
+              <a:t> determinant</a:t>
+            </a:r>
+          </a:p>
+          <a:p>
+            <a:r>
+              <a:rPr lang="nb-NO" dirty="0"/>
+              <a:t>Combinations of </a:t>
+            </a:r>
+            <a:r>
+              <a:rPr lang="nb-NO" dirty="0" err="1"/>
+              <a:t>Harmonic</a:t>
+            </a:r>
+            <a:r>
+              <a:rPr lang="nb-NO" dirty="0"/>
+              <a:t> Oscillator basis </a:t>
+            </a:r>
+            <a:r>
+              <a:rPr lang="nb-NO" dirty="0" err="1"/>
+              <a:t>functions</a:t>
+            </a:r>
+            <a:endParaRPr lang="nb-NO" dirty="0"/>
+          </a:p>
+          <a:p>
+            <a:r>
+              <a:rPr lang="nb-NO" dirty="0" err="1"/>
+              <a:t>Optimize</a:t>
+            </a:r>
+            <a:r>
+              <a:rPr lang="nb-NO" dirty="0"/>
+              <a:t> </a:t>
+            </a:r>
+            <a:r>
+              <a:rPr lang="nb-NO" dirty="0" err="1"/>
+              <a:t>using</a:t>
+            </a:r>
+            <a:r>
+              <a:rPr lang="nb-NO" dirty="0"/>
+              <a:t> an iterative </a:t>
+            </a:r>
+            <a:r>
+              <a:rPr lang="nb-NO" dirty="0" err="1"/>
+              <a:t>scheme</a:t>
+            </a:r>
+            <a:endParaRPr lang="en-US" dirty="0"/>
+          </a:p>
+        </p:txBody>
+      </p:sp>
+      <p:pic>
+        <p:nvPicPr>
+          <p:cNvPr id="7" name="Bilde 6">
+            <a:extLst>
+              <a:ext uri="{FF2B5EF4-FFF2-40B4-BE49-F238E27FC236}">
+                <a16:creationId xmlns:a16="http://schemas.microsoft.com/office/drawing/2014/main" id="{A260D95A-C6BE-6B4E-C23E-2FED885D7676}"/>
+              </a:ext>
+            </a:extLst>
+          </p:cNvPr>
+          <p:cNvPicPr>
+            <a:picLocks noChangeAspect="1"/>
+          </p:cNvPicPr>
+          <p:nvPr/>
+        </p:nvPicPr>
+        <p:blipFill>
+          <a:blip r:embed="rId2"/>
+          <a:stretch>
+            <a:fillRect/>
+          </a:stretch>
+        </p:blipFill>
+        <p:spPr>
+          <a:xfrm>
+            <a:off x="1261872" y="3823298"/>
+            <a:ext cx="6323043" cy="2120301"/>
+          </a:xfrm>
+          <a:prstGeom prst="rect">
+            <a:avLst/>
+          </a:prstGeom>
+        </p:spPr>
+      </p:pic>
     </p:spTree>
     <p:extLst>
       <p:ext uri="{BB962C8B-B14F-4D97-AF65-F5344CB8AC3E}">
-        <p14:creationId xmlns:p14="http://schemas.microsoft.com/office/powerpoint/2010/main" val="2448575732"/>
+        <p14:creationId xmlns:p14="http://schemas.microsoft.com/office/powerpoint/2010/main" val="3801046699"/>
       </p:ext>
     </p:extLst>
   </p:cSld>
@@ -4918,7 +5495,7 @@
           <p:cNvPr id="2" name="Title 1">
             <a:extLst>
               <a:ext uri="{FF2B5EF4-FFF2-40B4-BE49-F238E27FC236}">
-                <a16:creationId xmlns:a16="http://schemas.microsoft.com/office/drawing/2014/main" id="{E82202D1-0B2A-0631-54E7-EF7887D8B123}"/>
+                <a16:creationId xmlns:a16="http://schemas.microsoft.com/office/drawing/2014/main" id="{1F7C74C9-6C68-F353-9856-8598C7746238}"/>
               </a:ext>
             </a:extLst>
           </p:cNvPr>
@@ -4936,15 +5513,7 @@
           <a:p>
             <a:r>
               <a:rPr lang="en-US" noProof="0" dirty="0"/>
-              <a:t>The Hartree-</a:t>
-            </a:r>
-            <a:r>
-              <a:rPr lang="en-US" noProof="0" dirty="0" err="1"/>
-              <a:t>Fock</a:t>
-            </a:r>
-            <a:r>
-              <a:rPr lang="en-US" noProof="0" dirty="0"/>
-              <a:t> Method</a:t>
+              <a:t>Coupled Cluster</a:t>
             </a:r>
           </a:p>
         </p:txBody>
@@ -4954,7 +5523,7 @@
           <p:cNvPr id="3" name="Content Placeholder 2">
             <a:extLst>
               <a:ext uri="{FF2B5EF4-FFF2-40B4-BE49-F238E27FC236}">
-                <a16:creationId xmlns:a16="http://schemas.microsoft.com/office/drawing/2014/main" id="{8635EFA5-0FFF-D7A1-0200-12AEBCCFABFF}"/>
+                <a16:creationId xmlns:a16="http://schemas.microsoft.com/office/drawing/2014/main" id="{B5C213DA-2D7B-C2A2-A1B8-96767B69CB55}"/>
               </a:ext>
             </a:extLst>
           </p:cNvPr>
@@ -4965,19 +5534,332 @@
             <p:ph idx="1"/>
           </p:nvPr>
         </p:nvSpPr>
-        <p:spPr/>
-        <p:txBody>
-          <a:bodyPr/>
-          <a:lstStyle/>
-          <a:p>
-            <a:endParaRPr lang="en-US"/>
-          </a:p>
-        </p:txBody>
-      </p:sp>
+        <p:spPr>
+          <a:xfrm>
+            <a:off x="1261871" y="1828800"/>
+            <a:ext cx="7154341" cy="4351337"/>
+          </a:xfrm>
+        </p:spPr>
+        <p:txBody>
+          <a:bodyPr/>
+          <a:lstStyle/>
+          <a:p>
+            <a:r>
+              <a:rPr lang="nb-NO" dirty="0"/>
+              <a:t>Linear combination of many </a:t>
+            </a:r>
+            <a:r>
+              <a:rPr lang="nb-NO" dirty="0" err="1"/>
+              <a:t>Slater</a:t>
+            </a:r>
+            <a:r>
+              <a:rPr lang="nb-NO" dirty="0"/>
+              <a:t> determinants</a:t>
+            </a:r>
+          </a:p>
+          <a:p>
+            <a:r>
+              <a:rPr lang="nb-NO" dirty="0" err="1"/>
+              <a:t>Written</a:t>
+            </a:r>
+            <a:r>
+              <a:rPr lang="nb-NO" dirty="0"/>
+              <a:t> in terms of combinations of just a few operators</a:t>
+            </a:r>
+          </a:p>
+          <a:p>
+            <a:endParaRPr lang="nb-NO" dirty="0"/>
+          </a:p>
+          <a:p>
+            <a:endParaRPr lang="nb-NO" dirty="0"/>
+          </a:p>
+          <a:p>
+            <a:endParaRPr lang="nb-NO" dirty="0"/>
+          </a:p>
+          <a:p>
+            <a:r>
+              <a:rPr lang="nb-NO" dirty="0"/>
+              <a:t>We </a:t>
+            </a:r>
+            <a:r>
+              <a:rPr lang="nb-NO" dirty="0" err="1"/>
+              <a:t>solve</a:t>
+            </a:r>
+            <a:r>
+              <a:rPr lang="nb-NO" dirty="0"/>
+              <a:t> an </a:t>
+            </a:r>
+            <a:r>
+              <a:rPr lang="nb-NO" dirty="0" err="1"/>
+              <a:t>equation</a:t>
+            </a:r>
+            <a:r>
+              <a:rPr lang="nb-NO" dirty="0"/>
+              <a:t> </a:t>
+            </a:r>
+            <a:r>
+              <a:rPr lang="nb-NO" dirty="0" err="1"/>
+              <a:t>close</a:t>
+            </a:r>
+            <a:r>
+              <a:rPr lang="nb-NO" dirty="0"/>
+              <a:t> to </a:t>
+            </a:r>
+            <a:r>
+              <a:rPr lang="nb-NO" dirty="0" err="1"/>
+              <a:t>the</a:t>
+            </a:r>
+            <a:r>
+              <a:rPr lang="nb-NO" dirty="0"/>
+              <a:t> </a:t>
+            </a:r>
+            <a:r>
+              <a:rPr lang="nb-NO" dirty="0" err="1"/>
+              <a:t>Schrödinger</a:t>
+            </a:r>
+            <a:r>
+              <a:rPr lang="nb-NO" dirty="0"/>
+              <a:t> </a:t>
+            </a:r>
+            <a:r>
+              <a:rPr lang="nb-NO" dirty="0" err="1"/>
+              <a:t>equation</a:t>
+            </a:r>
+            <a:endParaRPr lang="nb-NO" dirty="0"/>
+          </a:p>
+          <a:p>
+            <a:endParaRPr lang="nb-NO" dirty="0"/>
+          </a:p>
+          <a:p>
+            <a:endParaRPr lang="nb-NO" dirty="0"/>
+          </a:p>
+          <a:p>
+            <a:r>
+              <a:rPr lang="nb-NO" dirty="0" err="1"/>
+              <a:t>Often</a:t>
+            </a:r>
+            <a:r>
+              <a:rPr lang="nb-NO" dirty="0"/>
+              <a:t> </a:t>
+            </a:r>
+            <a:r>
+              <a:rPr lang="nb-NO" dirty="0" err="1"/>
+              <a:t>gives</a:t>
+            </a:r>
+            <a:r>
+              <a:rPr lang="nb-NO" dirty="0"/>
+              <a:t> a </a:t>
+            </a:r>
+            <a:r>
+              <a:rPr lang="nb-NO" dirty="0" err="1"/>
+              <a:t>very</a:t>
+            </a:r>
+            <a:r>
+              <a:rPr lang="nb-NO" dirty="0"/>
+              <a:t> </a:t>
+            </a:r>
+            <a:r>
+              <a:rPr lang="nb-NO" dirty="0" err="1"/>
+              <a:t>good</a:t>
+            </a:r>
+            <a:r>
+              <a:rPr lang="nb-NO" dirty="0"/>
+              <a:t> </a:t>
+            </a:r>
+            <a:r>
+              <a:rPr lang="nb-NO" dirty="0" err="1"/>
+              <a:t>estimate</a:t>
+            </a:r>
+            <a:r>
+              <a:rPr lang="nb-NO" dirty="0"/>
+              <a:t> for </a:t>
+            </a:r>
+            <a:r>
+              <a:rPr lang="nb-NO" dirty="0" err="1"/>
+              <a:t>the</a:t>
+            </a:r>
+            <a:r>
+              <a:rPr lang="nb-NO" dirty="0"/>
+              <a:t> </a:t>
+            </a:r>
+            <a:r>
+              <a:rPr lang="nb-NO" dirty="0" err="1"/>
+              <a:t>ground</a:t>
+            </a:r>
+            <a:r>
+              <a:rPr lang="nb-NO" dirty="0"/>
+              <a:t> </a:t>
+            </a:r>
+            <a:r>
+              <a:rPr lang="nb-NO" dirty="0" err="1"/>
+              <a:t>state</a:t>
+            </a:r>
+            <a:r>
+              <a:rPr lang="nb-NO" dirty="0"/>
+              <a:t> </a:t>
+            </a:r>
+            <a:r>
+              <a:rPr lang="nb-NO" dirty="0" err="1"/>
+              <a:t>energy</a:t>
+            </a:r>
+            <a:endParaRPr lang="nb-NO" dirty="0"/>
+          </a:p>
+        </p:txBody>
+      </p:sp>
+      <p:pic>
+        <p:nvPicPr>
+          <p:cNvPr id="13" name="Bilde 12">
+            <a:extLst>
+              <a:ext uri="{FF2B5EF4-FFF2-40B4-BE49-F238E27FC236}">
+                <a16:creationId xmlns:a16="http://schemas.microsoft.com/office/drawing/2014/main" id="{6652A13A-4E62-4309-F235-BD8CB3949542}"/>
+              </a:ext>
+            </a:extLst>
+          </p:cNvPr>
+          <p:cNvPicPr>
+            <a:picLocks noChangeAspect="1"/>
+          </p:cNvPicPr>
+          <p:nvPr/>
+        </p:nvPicPr>
+        <p:blipFill>
+          <a:blip r:embed="rId2"/>
+          <a:stretch>
+            <a:fillRect/>
+          </a:stretch>
+        </p:blipFill>
+        <p:spPr>
+          <a:xfrm>
+            <a:off x="900427" y="2570035"/>
+            <a:ext cx="8021169" cy="981212"/>
+          </a:xfrm>
+          <a:prstGeom prst="rect">
+            <a:avLst/>
+          </a:prstGeom>
+        </p:spPr>
+      </p:pic>
+      <p:pic>
+        <p:nvPicPr>
+          <p:cNvPr id="15" name="Bilde 14">
+            <a:extLst>
+              <a:ext uri="{FF2B5EF4-FFF2-40B4-BE49-F238E27FC236}">
+                <a16:creationId xmlns:a16="http://schemas.microsoft.com/office/drawing/2014/main" id="{4F2626D7-FAC7-E70E-E262-105C22B67D77}"/>
+              </a:ext>
+            </a:extLst>
+          </p:cNvPr>
+          <p:cNvPicPr>
+            <a:picLocks noChangeAspect="1"/>
+          </p:cNvPicPr>
+          <p:nvPr/>
+        </p:nvPicPr>
+        <p:blipFill>
+          <a:blip r:embed="rId3"/>
+          <a:stretch>
+            <a:fillRect/>
+          </a:stretch>
+        </p:blipFill>
+        <p:spPr>
+          <a:xfrm>
+            <a:off x="900427" y="3429000"/>
+            <a:ext cx="4153480" cy="771633"/>
+          </a:xfrm>
+          <a:prstGeom prst="rect">
+            <a:avLst/>
+          </a:prstGeom>
+        </p:spPr>
+      </p:pic>
+      <p:pic>
+        <p:nvPicPr>
+          <p:cNvPr id="21" name="Bilde 20">
+            <a:extLst>
+              <a:ext uri="{FF2B5EF4-FFF2-40B4-BE49-F238E27FC236}">
+                <a16:creationId xmlns:a16="http://schemas.microsoft.com/office/drawing/2014/main" id="{76AD1AB3-040A-7305-3515-A871791B1C59}"/>
+              </a:ext>
+            </a:extLst>
+          </p:cNvPr>
+          <p:cNvPicPr>
+            <a:picLocks noChangeAspect="1"/>
+          </p:cNvPicPr>
+          <p:nvPr/>
+        </p:nvPicPr>
+        <p:blipFill>
+          <a:blip r:embed="rId4"/>
+          <a:stretch>
+            <a:fillRect/>
+          </a:stretch>
+        </p:blipFill>
+        <p:spPr>
+          <a:xfrm>
+            <a:off x="4105291" y="4823363"/>
+            <a:ext cx="3000182" cy="472470"/>
+          </a:xfrm>
+          <a:prstGeom prst="rect">
+            <a:avLst/>
+          </a:prstGeom>
+        </p:spPr>
+      </p:pic>
+      <p:pic>
+        <p:nvPicPr>
+          <p:cNvPr id="23" name="Bilde 22">
+            <a:extLst>
+              <a:ext uri="{FF2B5EF4-FFF2-40B4-BE49-F238E27FC236}">
+                <a16:creationId xmlns:a16="http://schemas.microsoft.com/office/drawing/2014/main" id="{824F0BC1-ADFB-808A-FBC1-C62B83646EBB}"/>
+              </a:ext>
+            </a:extLst>
+          </p:cNvPr>
+          <p:cNvPicPr>
+            <a:picLocks noChangeAspect="1"/>
+          </p:cNvPicPr>
+          <p:nvPr/>
+        </p:nvPicPr>
+        <p:blipFill>
+          <a:blip r:embed="rId5"/>
+          <a:stretch>
+            <a:fillRect/>
+          </a:stretch>
+        </p:blipFill>
+        <p:spPr>
+          <a:xfrm>
+            <a:off x="214995" y="4823363"/>
+            <a:ext cx="3097763" cy="528117"/>
+          </a:xfrm>
+          <a:prstGeom prst="rect">
+            <a:avLst/>
+          </a:prstGeom>
+        </p:spPr>
+      </p:pic>
+      <p:pic>
+        <p:nvPicPr>
+          <p:cNvPr id="25" name="Bilde 24">
+            <a:extLst>
+              <a:ext uri="{FF2B5EF4-FFF2-40B4-BE49-F238E27FC236}">
+                <a16:creationId xmlns:a16="http://schemas.microsoft.com/office/drawing/2014/main" id="{927BDF54-FF54-1C45-846C-00CE21A38E36}"/>
+              </a:ext>
+            </a:extLst>
+          </p:cNvPr>
+          <p:cNvPicPr>
+            <a:picLocks noChangeAspect="1"/>
+          </p:cNvPicPr>
+          <p:nvPr/>
+        </p:nvPicPr>
+        <p:blipFill>
+          <a:blip r:embed="rId6"/>
+          <a:stretch>
+            <a:fillRect/>
+          </a:stretch>
+        </p:blipFill>
+        <p:spPr>
+          <a:xfrm>
+            <a:off x="7898006" y="4772499"/>
+            <a:ext cx="3000182" cy="574197"/>
+          </a:xfrm>
+          <a:prstGeom prst="rect">
+            <a:avLst/>
+          </a:prstGeom>
+        </p:spPr>
+      </p:pic>
     </p:spTree>
     <p:extLst>
       <p:ext uri="{BB962C8B-B14F-4D97-AF65-F5344CB8AC3E}">
-        <p14:creationId xmlns:p14="http://schemas.microsoft.com/office/powerpoint/2010/main" val="3801046699"/>
+        <p14:creationId xmlns:p14="http://schemas.microsoft.com/office/powerpoint/2010/main" val="2550532346"/>
       </p:ext>
     </p:extLst>
   </p:cSld>
@@ -5009,7 +5891,7 @@
           <p:cNvPr id="2" name="Title 1">
             <a:extLst>
               <a:ext uri="{FF2B5EF4-FFF2-40B4-BE49-F238E27FC236}">
-                <a16:creationId xmlns:a16="http://schemas.microsoft.com/office/drawing/2014/main" id="{502507E8-70FF-BB56-F01F-0CB1FAAA88A4}"/>
+                <a16:creationId xmlns:a16="http://schemas.microsoft.com/office/drawing/2014/main" id="{5E9A9262-9F18-AC45-BC4A-9D157493194D}"/>
               </a:ext>
             </a:extLst>
           </p:cNvPr>
@@ -5027,7 +5909,7 @@
           <a:p>
             <a:r>
               <a:rPr lang="en-US" noProof="0" dirty="0"/>
-              <a:t>The Coupled Cluster Method</a:t>
+              <a:t>Variational Monte Carlo</a:t>
             </a:r>
           </a:p>
         </p:txBody>
@@ -5037,7 +5919,7 @@
           <p:cNvPr id="3" name="Content Placeholder 2">
             <a:extLst>
               <a:ext uri="{FF2B5EF4-FFF2-40B4-BE49-F238E27FC236}">
-                <a16:creationId xmlns:a16="http://schemas.microsoft.com/office/drawing/2014/main" id="{BD0F44E1-A1B7-C319-3A12-066164310FFF}"/>
+                <a16:creationId xmlns:a16="http://schemas.microsoft.com/office/drawing/2014/main" id="{0DB09C29-0BA1-DC15-0143-F318A6518761}"/>
               </a:ext>
             </a:extLst>
           </p:cNvPr>
@@ -5053,14 +5935,14 @@
           <a:bodyPr/>
           <a:lstStyle/>
           <a:p>
-            <a:endParaRPr lang="en-US"/>
+            <a:endParaRPr lang="en-US" dirty="0"/>
           </a:p>
         </p:txBody>
       </p:sp>
     </p:spTree>
     <p:extLst>
       <p:ext uri="{BB962C8B-B14F-4D97-AF65-F5344CB8AC3E}">
-        <p14:creationId xmlns:p14="http://schemas.microsoft.com/office/powerpoint/2010/main" val="3616414256"/>
+        <p14:creationId xmlns:p14="http://schemas.microsoft.com/office/powerpoint/2010/main" val="3129863308"/>
       </p:ext>
     </p:extLst>
   </p:cSld>
@@ -5092,7 +5974,7 @@
           <p:cNvPr id="2" name="Title 1">
             <a:extLst>
               <a:ext uri="{FF2B5EF4-FFF2-40B4-BE49-F238E27FC236}">
-                <a16:creationId xmlns:a16="http://schemas.microsoft.com/office/drawing/2014/main" id="{5E9A9262-9F18-AC45-BC4A-9D157493194D}"/>
+                <a16:creationId xmlns:a16="http://schemas.microsoft.com/office/drawing/2014/main" id="{B1E12DC7-49F9-A6C7-D63E-2221E2EB5EDB}"/>
               </a:ext>
             </a:extLst>
           </p:cNvPr>
@@ -5110,7 +5992,7 @@
           <a:p>
             <a:r>
               <a:rPr lang="en-US" noProof="0" dirty="0"/>
-              <a:t>Variational Monte Carlo</a:t>
+              <a:t>Neural Networks</a:t>
             </a:r>
           </a:p>
         </p:txBody>
@@ -5120,7 +6002,7 @@
           <p:cNvPr id="3" name="Content Placeholder 2">
             <a:extLst>
               <a:ext uri="{FF2B5EF4-FFF2-40B4-BE49-F238E27FC236}">
-                <a16:creationId xmlns:a16="http://schemas.microsoft.com/office/drawing/2014/main" id="{0DB09C29-0BA1-DC15-0143-F318A6518761}"/>
+                <a16:creationId xmlns:a16="http://schemas.microsoft.com/office/drawing/2014/main" id="{2DE65328-0DD8-ECCA-A842-DBF06975A1B9}"/>
               </a:ext>
             </a:extLst>
           </p:cNvPr>
@@ -5131,19 +6013,177 @@
             <p:ph idx="1"/>
           </p:nvPr>
         </p:nvSpPr>
-        <p:spPr/>
-        <p:txBody>
-          <a:bodyPr/>
-          <a:lstStyle/>
-          <a:p>
-            <a:endParaRPr lang="en-US"/>
-          </a:p>
-        </p:txBody>
-      </p:sp>
+        <p:spPr>
+          <a:xfrm>
+            <a:off x="1261872" y="1828800"/>
+            <a:ext cx="4719050" cy="4351337"/>
+          </a:xfrm>
+        </p:spPr>
+        <p:txBody>
+          <a:bodyPr>
+            <a:normAutofit/>
+          </a:bodyPr>
+          <a:lstStyle/>
+          <a:p>
+            <a:r>
+              <a:rPr lang="nb-NO" dirty="0" err="1"/>
+              <a:t>Very</a:t>
+            </a:r>
+            <a:r>
+              <a:rPr lang="nb-NO" dirty="0"/>
+              <a:t> </a:t>
+            </a:r>
+            <a:r>
+              <a:rPr lang="nb-NO" dirty="0" err="1"/>
+              <a:t>flexible</a:t>
+            </a:r>
+            <a:r>
+              <a:rPr lang="nb-NO" dirty="0"/>
+              <a:t> </a:t>
+            </a:r>
+            <a:r>
+              <a:rPr lang="nb-NO" dirty="0" err="1"/>
+              <a:t>function</a:t>
+            </a:r>
+            <a:br>
+              <a:rPr lang="nb-NO" dirty="0"/>
+            </a:br>
+            <a:r>
+              <a:rPr lang="nb-NO" dirty="0"/>
+              <a:t>- The universal </a:t>
+            </a:r>
+            <a:r>
+              <a:rPr lang="nb-NO" dirty="0" err="1"/>
+              <a:t>approximation</a:t>
+            </a:r>
+            <a:r>
+              <a:rPr lang="nb-NO" dirty="0"/>
+              <a:t> </a:t>
+            </a:r>
+            <a:r>
+              <a:rPr lang="nb-NO" dirty="0" err="1"/>
+              <a:t>theorem</a:t>
+            </a:r>
+            <a:r>
+              <a:rPr lang="nb-NO" dirty="0"/>
+              <a:t>: «</a:t>
+            </a:r>
+            <a:r>
+              <a:rPr lang="nb-NO" dirty="0" err="1"/>
+              <a:t>Can</a:t>
+            </a:r>
+            <a:r>
+              <a:rPr lang="nb-NO" dirty="0"/>
+              <a:t> </a:t>
+            </a:r>
+            <a:r>
+              <a:rPr lang="nb-NO" dirty="0" err="1"/>
+              <a:t>approximate</a:t>
+            </a:r>
+            <a:r>
+              <a:rPr lang="nb-NO" dirty="0"/>
+              <a:t> any </a:t>
+            </a:r>
+            <a:r>
+              <a:rPr lang="nb-NO" dirty="0" err="1"/>
+              <a:t>function</a:t>
+            </a:r>
+            <a:r>
+              <a:rPr lang="nb-NO" dirty="0"/>
+              <a:t>»</a:t>
+            </a:r>
+          </a:p>
+          <a:p>
+            <a:r>
+              <a:rPr lang="nb-NO" dirty="0"/>
+              <a:t>Must be </a:t>
+            </a:r>
+            <a:r>
+              <a:rPr lang="nb-NO" dirty="0" err="1"/>
+              <a:t>optimized</a:t>
+            </a:r>
+            <a:endParaRPr lang="nb-NO" dirty="0"/>
+          </a:p>
+          <a:p>
+            <a:r>
+              <a:rPr lang="nb-NO" dirty="0"/>
+              <a:t>Has </a:t>
+            </a:r>
+            <a:r>
+              <a:rPr lang="nb-NO" dirty="0" err="1"/>
+              <a:t>shown</a:t>
+            </a:r>
+            <a:r>
+              <a:rPr lang="nb-NO" dirty="0"/>
+              <a:t> </a:t>
+            </a:r>
+            <a:r>
+              <a:rPr lang="nb-NO" dirty="0" err="1"/>
+              <a:t>great</a:t>
+            </a:r>
+            <a:r>
+              <a:rPr lang="nb-NO" dirty="0"/>
+              <a:t> </a:t>
+            </a:r>
+            <a:r>
+              <a:rPr lang="nb-NO" dirty="0" err="1"/>
+              <a:t>results</a:t>
+            </a:r>
+            <a:r>
+              <a:rPr lang="nb-NO" dirty="0"/>
+              <a:t> in many </a:t>
+            </a:r>
+            <a:r>
+              <a:rPr lang="nb-NO" dirty="0" err="1"/>
+              <a:t>fields</a:t>
+            </a:r>
+            <a:endParaRPr lang="nb-NO" dirty="0"/>
+          </a:p>
+        </p:txBody>
+      </p:sp>
+      <p:pic>
+        <p:nvPicPr>
+          <p:cNvPr id="5" name="Grafikk 4">
+            <a:extLst>
+              <a:ext uri="{FF2B5EF4-FFF2-40B4-BE49-F238E27FC236}">
+                <a16:creationId xmlns:a16="http://schemas.microsoft.com/office/drawing/2014/main" id="{01D8C0CF-6DB8-3E37-AB07-2820C91C39FC}"/>
+              </a:ext>
+            </a:extLst>
+          </p:cNvPr>
+          <p:cNvPicPr>
+            <a:picLocks noChangeAspect="1"/>
+          </p:cNvPicPr>
+          <p:nvPr/>
+        </p:nvPicPr>
+        <p:blipFill>
+          <a:blip r:embed="rId2">
+            <a:extLst>
+              <a:ext uri="{28A0092B-C50C-407E-A947-70E740481C1C}">
+                <a14:useLocalDpi xmlns:a14="http://schemas.microsoft.com/office/drawing/2010/main" val="0"/>
+              </a:ext>
+              <a:ext uri="{96DAC541-7B7A-43D3-8B79-37D633B846F1}">
+                <asvg:svgBlip xmlns:asvg="http://schemas.microsoft.com/office/drawing/2016/SVG/main" r:embed="rId3"/>
+              </a:ext>
+            </a:extLst>
+          </a:blip>
+          <a:stretch>
+            <a:fillRect/>
+          </a:stretch>
+        </p:blipFill>
+        <p:spPr>
+          <a:xfrm>
+            <a:off x="5754417" y="1912777"/>
+            <a:ext cx="5593459" cy="3621912"/>
+          </a:xfrm>
+          <a:prstGeom prst="rect">
+            <a:avLst/>
+          </a:prstGeom>
+        </p:spPr>
+      </p:pic>
     </p:spTree>
     <p:extLst>
       <p:ext uri="{BB962C8B-B14F-4D97-AF65-F5344CB8AC3E}">
-        <p14:creationId xmlns:p14="http://schemas.microsoft.com/office/powerpoint/2010/main" val="3129863308"/>
+        <p14:creationId xmlns:p14="http://schemas.microsoft.com/office/powerpoint/2010/main" val="2236621290"/>
       </p:ext>
     </p:extLst>
   </p:cSld>
@@ -5154,9 +6194,9 @@
 </file>
 
 <file path=ppt/theme/theme1.xml><?xml version="1.0" encoding="utf-8"?>
-<a:theme xmlns:a="http://schemas.openxmlformats.org/drawingml/2006/main" name="View">
+<a:theme xmlns:a="http://schemas.openxmlformats.org/drawingml/2006/main" name="Utsikt">
   <a:themeElements>
-    <a:clrScheme name="View">
+    <a:clrScheme name="Utsikt">
       <a:dk1>
         <a:srgbClr val="000000"/>
       </a:dk1>
@@ -5194,7 +6234,7 @@
         <a:srgbClr val="ABAFA5"/>
       </a:folHlink>
     </a:clrScheme>
-    <a:fontScheme name="View">
+    <a:fontScheme name="Utsikt">
       <a:majorFont>
         <a:latin typeface="Century Schoolbook" panose="02040604050505020304"/>
         <a:ea typeface=""/>
@@ -5266,7 +6306,7 @@
         <a:font script="Geor" typeface="Sylfaen"/>
       </a:minorFont>
     </a:fontScheme>
-    <a:fmtScheme name="View">
+    <a:fmtScheme name="Utsikt">
       <a:fillStyleLst>
         <a:solidFill>
           <a:schemeClr val="phClr"/>

</xml_diff>